<commit_message>
formatted layout, added animations
</commit_message>
<xml_diff>
--- a/Business Presentation.pptx
+++ b/Business Presentation.pptx
@@ -109,6 +109,11 @@
       </a:defRPr>
     </a:lvl9pPr>
   </p:defaultTextStyle>
+  <p:extLst>
+    <p:ext uri="{EFAFB233-063F-42B5-8137-9DF3F51BA10A}">
+      <p15:sldGuideLst xmlns:p15="http://schemas.microsoft.com/office/powerpoint/2012/main"/>
+    </p:ext>
+  </p:extLst>
 </p:presentation>
 </file>
 
@@ -243,7 +248,7 @@
           <a:p>
             <a:fld id="{6664DAC3-EA40-4371-98C6-B5FFAA610E0F}" type="datetimeFigureOut">
               <a:rPr lang="en-GB" smtClean="0"/>
-              <a:t>07/03/2019</a:t>
+              <a:t>08/03/2019</a:t>
             </a:fld>
             <a:endParaRPr lang="en-GB"/>
           </a:p>
@@ -413,7 +418,7 @@
           <a:p>
             <a:fld id="{6664DAC3-EA40-4371-98C6-B5FFAA610E0F}" type="datetimeFigureOut">
               <a:rPr lang="en-GB" smtClean="0"/>
-              <a:t>07/03/2019</a:t>
+              <a:t>08/03/2019</a:t>
             </a:fld>
             <a:endParaRPr lang="en-GB"/>
           </a:p>
@@ -593,7 +598,7 @@
           <a:p>
             <a:fld id="{6664DAC3-EA40-4371-98C6-B5FFAA610E0F}" type="datetimeFigureOut">
               <a:rPr lang="en-GB" smtClean="0"/>
-              <a:t>07/03/2019</a:t>
+              <a:t>08/03/2019</a:t>
             </a:fld>
             <a:endParaRPr lang="en-GB"/>
           </a:p>
@@ -763,7 +768,7 @@
           <a:p>
             <a:fld id="{6664DAC3-EA40-4371-98C6-B5FFAA610E0F}" type="datetimeFigureOut">
               <a:rPr lang="en-GB" smtClean="0"/>
-              <a:t>07/03/2019</a:t>
+              <a:t>08/03/2019</a:t>
             </a:fld>
             <a:endParaRPr lang="en-GB"/>
           </a:p>
@@ -1009,7 +1014,7 @@
           <a:p>
             <a:fld id="{6664DAC3-EA40-4371-98C6-B5FFAA610E0F}" type="datetimeFigureOut">
               <a:rPr lang="en-GB" smtClean="0"/>
-              <a:t>07/03/2019</a:t>
+              <a:t>08/03/2019</a:t>
             </a:fld>
             <a:endParaRPr lang="en-GB"/>
           </a:p>
@@ -1241,7 +1246,7 @@
           <a:p>
             <a:fld id="{6664DAC3-EA40-4371-98C6-B5FFAA610E0F}" type="datetimeFigureOut">
               <a:rPr lang="en-GB" smtClean="0"/>
-              <a:t>07/03/2019</a:t>
+              <a:t>08/03/2019</a:t>
             </a:fld>
             <a:endParaRPr lang="en-GB"/>
           </a:p>
@@ -1608,7 +1613,7 @@
           <a:p>
             <a:fld id="{6664DAC3-EA40-4371-98C6-B5FFAA610E0F}" type="datetimeFigureOut">
               <a:rPr lang="en-GB" smtClean="0"/>
-              <a:t>07/03/2019</a:t>
+              <a:t>08/03/2019</a:t>
             </a:fld>
             <a:endParaRPr lang="en-GB"/>
           </a:p>
@@ -1726,7 +1731,7 @@
           <a:p>
             <a:fld id="{6664DAC3-EA40-4371-98C6-B5FFAA610E0F}" type="datetimeFigureOut">
               <a:rPr lang="en-GB" smtClean="0"/>
-              <a:t>07/03/2019</a:t>
+              <a:t>08/03/2019</a:t>
             </a:fld>
             <a:endParaRPr lang="en-GB"/>
           </a:p>
@@ -1821,7 +1826,7 @@
           <a:p>
             <a:fld id="{6664DAC3-EA40-4371-98C6-B5FFAA610E0F}" type="datetimeFigureOut">
               <a:rPr lang="en-GB" smtClean="0"/>
-              <a:t>07/03/2019</a:t>
+              <a:t>08/03/2019</a:t>
             </a:fld>
             <a:endParaRPr lang="en-GB"/>
           </a:p>
@@ -2098,7 +2103,7 @@
           <a:p>
             <a:fld id="{6664DAC3-EA40-4371-98C6-B5FFAA610E0F}" type="datetimeFigureOut">
               <a:rPr lang="en-GB" smtClean="0"/>
-              <a:t>07/03/2019</a:t>
+              <a:t>08/03/2019</a:t>
             </a:fld>
             <a:endParaRPr lang="en-GB"/>
           </a:p>
@@ -2351,7 +2356,7 @@
           <a:p>
             <a:fld id="{6664DAC3-EA40-4371-98C6-B5FFAA610E0F}" type="datetimeFigureOut">
               <a:rPr lang="en-GB" smtClean="0"/>
-              <a:t>07/03/2019</a:t>
+              <a:t>08/03/2019</a:t>
             </a:fld>
             <a:endParaRPr lang="en-GB"/>
           </a:p>
@@ -2564,7 +2569,7 @@
           <a:p>
             <a:fld id="{6664DAC3-EA40-4371-98C6-B5FFAA610E0F}" type="datetimeFigureOut">
               <a:rPr lang="en-GB" smtClean="0"/>
-              <a:t>07/03/2019</a:t>
+              <a:t>08/03/2019</a:t>
             </a:fld>
             <a:endParaRPr lang="en-GB"/>
           </a:p>
@@ -2969,6 +2974,43 @@
           <a:chExt cx="0" cy="0"/>
         </a:xfrm>
       </p:grpSpPr>
+      <p:pic>
+        <p:nvPicPr>
+          <p:cNvPr id="4" name="Picture 3"/>
+          <p:cNvPicPr>
+            <a:picLocks noChangeAspect="1"/>
+          </p:cNvPicPr>
+          <p:nvPr/>
+        </p:nvPicPr>
+        <p:blipFill>
+          <a:blip r:embed="rId2">
+            <a:duotone>
+              <a:schemeClr val="bg2">
+                <a:shade val="45000"/>
+                <a:satMod val="135000"/>
+              </a:schemeClr>
+              <a:prstClr val="white"/>
+            </a:duotone>
+            <a:extLst>
+              <a:ext uri="{28A0092B-C50C-407E-A947-70E740481C1C}">
+                <a14:useLocalDpi xmlns:a14="http://schemas.microsoft.com/office/drawing/2010/main" val="0"/>
+              </a:ext>
+            </a:extLst>
+          </a:blip>
+          <a:stretch>
+            <a:fillRect/>
+          </a:stretch>
+        </p:blipFill>
+        <p:spPr>
+          <a:xfrm>
+            <a:off x="-1898" y="0"/>
+            <a:ext cx="12192000" cy="6858000"/>
+          </a:xfrm>
+          <a:prstGeom prst="rect">
+            <a:avLst/>
+          </a:prstGeom>
+        </p:spPr>
+      </p:pic>
       <p:sp>
         <p:nvSpPr>
           <p:cNvPr id="2" name="Title 1"/>
@@ -2977,6 +3019,35 @@
           </p:cNvSpPr>
           <p:nvPr>
             <p:ph type="ctrTitle"/>
+          </p:nvPr>
+        </p:nvSpPr>
+        <p:spPr/>
+        <p:txBody>
+          <a:bodyPr>
+            <a:normAutofit/>
+          </a:bodyPr>
+          <a:lstStyle/>
+          <a:p>
+            <a:r>
+              <a:rPr lang="en-GB" sz="9600" dirty="0" smtClean="0">
+                <a:latin typeface="Impact" panose="020B0806030902050204" pitchFamily="34" charset="0"/>
+              </a:rPr>
+              <a:t>INKD</a:t>
+            </a:r>
+            <a:endParaRPr lang="en-GB" sz="9600" dirty="0">
+              <a:latin typeface="Impact" panose="020B0806030902050204" pitchFamily="34" charset="0"/>
+            </a:endParaRPr>
+          </a:p>
+        </p:txBody>
+      </p:sp>
+      <p:sp>
+        <p:nvSpPr>
+          <p:cNvPr id="3" name="Subtitle 2"/>
+          <p:cNvSpPr>
+            <a:spLocks noGrp="1"/>
+          </p:cNvSpPr>
+          <p:nvPr>
+            <p:ph type="subTitle" idx="1"/>
           </p:nvPr>
         </p:nvSpPr>
         <p:spPr/>
@@ -2986,35 +3057,94 @@
           <a:p>
             <a:r>
               <a:rPr lang="en-GB" dirty="0" smtClean="0"/>
-              <a:t>INKD</a:t>
+              <a:t>Business </a:t>
+            </a:r>
+            <a:r>
+              <a:rPr lang="en-GB" dirty="0" smtClean="0"/>
+              <a:t>Proposals</a:t>
             </a:r>
             <a:endParaRPr lang="en-GB" dirty="0"/>
           </a:p>
         </p:txBody>
       </p:sp>
-      <p:sp>
-        <p:nvSpPr>
-          <p:cNvPr id="3" name="Subtitle 2"/>
-          <p:cNvSpPr>
-            <a:spLocks noGrp="1"/>
-          </p:cNvSpPr>
-          <p:nvPr>
-            <p:ph type="subTitle" idx="1"/>
-          </p:nvPr>
-        </p:nvSpPr>
-        <p:spPr/>
-        <p:txBody>
-          <a:bodyPr/>
-          <a:lstStyle/>
-          <a:p>
-            <a:r>
-              <a:rPr lang="en-GB" dirty="0" smtClean="0"/>
-              <a:t>Business Prop</a:t>
-            </a:r>
-            <a:endParaRPr lang="en-GB" dirty="0"/>
-          </a:p>
-        </p:txBody>
-      </p:sp>
+      <p:pic>
+        <p:nvPicPr>
+          <p:cNvPr id="5" name="Picture 4"/>
+          <p:cNvPicPr>
+            <a:picLocks noChangeAspect="1"/>
+          </p:cNvPicPr>
+          <p:nvPr/>
+        </p:nvPicPr>
+        <p:blipFill>
+          <a:blip r:embed="rId3" cstate="print">
+            <a:extLst>
+              <a:ext uri="{BEBA8EAE-BF5A-486C-A8C5-ECC9F3942E4B}">
+                <a14:imgProps xmlns:a14="http://schemas.microsoft.com/office/drawing/2010/main">
+                  <a14:imgLayer r:embed="rId4">
+                    <a14:imgEffect>
+                      <a14:brightnessContrast bright="-40000" contrast="40000"/>
+                    </a14:imgEffect>
+                  </a14:imgLayer>
+                </a14:imgProps>
+              </a:ext>
+              <a:ext uri="{28A0092B-C50C-407E-A947-70E740481C1C}">
+                <a14:useLocalDpi xmlns:a14="http://schemas.microsoft.com/office/drawing/2010/main" val="0"/>
+              </a:ext>
+            </a:extLst>
+          </a:blip>
+          <a:stretch>
+            <a:fillRect/>
+          </a:stretch>
+        </p:blipFill>
+        <p:spPr>
+          <a:xfrm rot="19437392">
+            <a:off x="438543" y="4455250"/>
+            <a:ext cx="2219012" cy="2219012"/>
+          </a:xfrm>
+          <a:prstGeom prst="rect">
+            <a:avLst/>
+          </a:prstGeom>
+        </p:spPr>
+      </p:pic>
+      <p:pic>
+        <p:nvPicPr>
+          <p:cNvPr id="6" name="Picture 5"/>
+          <p:cNvPicPr>
+            <a:picLocks noChangeAspect="1"/>
+          </p:cNvPicPr>
+          <p:nvPr/>
+        </p:nvPicPr>
+        <p:blipFill>
+          <a:blip r:embed="rId5" cstate="print">
+            <a:extLst>
+              <a:ext uri="{BEBA8EAE-BF5A-486C-A8C5-ECC9F3942E4B}">
+                <a14:imgProps xmlns:a14="http://schemas.microsoft.com/office/drawing/2010/main">
+                  <a14:imgLayer r:embed="rId4">
+                    <a14:imgEffect>
+                      <a14:brightnessContrast bright="-40000" contrast="40000"/>
+                    </a14:imgEffect>
+                  </a14:imgLayer>
+                </a14:imgProps>
+              </a:ext>
+              <a:ext uri="{28A0092B-C50C-407E-A947-70E740481C1C}">
+                <a14:useLocalDpi xmlns:a14="http://schemas.microsoft.com/office/drawing/2010/main" val="0"/>
+              </a:ext>
+            </a:extLst>
+          </a:blip>
+          <a:stretch>
+            <a:fillRect/>
+          </a:stretch>
+        </p:blipFill>
+        <p:spPr>
+          <a:xfrm rot="19437392">
+            <a:off x="10172950" y="144966"/>
+            <a:ext cx="1584704" cy="1584704"/>
+          </a:xfrm>
+          <a:prstGeom prst="rect">
+            <a:avLst/>
+          </a:prstGeom>
+        </p:spPr>
+      </p:pic>
     </p:spTree>
     <p:extLst>
       <p:ext uri="{BB962C8B-B14F-4D97-AF65-F5344CB8AC3E}">
@@ -3025,6 +3155,13 @@
   <p:clrMapOvr>
     <a:masterClrMapping/>
   </p:clrMapOvr>
+  <p:timing>
+    <p:tnLst>
+      <p:par>
+        <p:cTn id="1" dur="indefinite" restart="never" nodeType="tmRoot"/>
+      </p:par>
+    </p:tnLst>
+  </p:timing>
 </p:sld>
 </file>
 
@@ -3045,6 +3182,43 @@
           <a:chExt cx="0" cy="0"/>
         </a:xfrm>
       </p:grpSpPr>
+      <p:pic>
+        <p:nvPicPr>
+          <p:cNvPr id="4" name="Picture 3"/>
+          <p:cNvPicPr>
+            <a:picLocks noChangeAspect="1"/>
+          </p:cNvPicPr>
+          <p:nvPr/>
+        </p:nvPicPr>
+        <p:blipFill>
+          <a:blip r:embed="rId2">
+            <a:duotone>
+              <a:schemeClr val="bg2">
+                <a:shade val="45000"/>
+                <a:satMod val="135000"/>
+              </a:schemeClr>
+              <a:prstClr val="white"/>
+            </a:duotone>
+            <a:extLst>
+              <a:ext uri="{28A0092B-C50C-407E-A947-70E740481C1C}">
+                <a14:useLocalDpi xmlns:a14="http://schemas.microsoft.com/office/drawing/2010/main" val="0"/>
+              </a:ext>
+            </a:extLst>
+          </a:blip>
+          <a:stretch>
+            <a:fillRect/>
+          </a:stretch>
+        </p:blipFill>
+        <p:spPr>
+          <a:xfrm>
+            <a:off x="-1898" y="0"/>
+            <a:ext cx="12192000" cy="6858000"/>
+          </a:xfrm>
+          <a:prstGeom prst="rect">
+            <a:avLst/>
+          </a:prstGeom>
+        </p:spPr>
+      </p:pic>
       <p:sp>
         <p:nvSpPr>
           <p:cNvPr id="2" name="Title 1"/>
@@ -3061,10 +3235,20 @@
           <a:lstStyle/>
           <a:p>
             <a:r>
-              <a:rPr lang="en-GB" dirty="0" smtClean="0"/>
-              <a:t>Self Publishing Prop</a:t>
-            </a:r>
-            <a:endParaRPr lang="en-GB" dirty="0"/>
+              <a:rPr lang="en-GB" dirty="0" smtClean="0">
+                <a:latin typeface="Impact" panose="020B0806030902050204" pitchFamily="34" charset="0"/>
+              </a:rPr>
+              <a:t>Self Publishing </a:t>
+            </a:r>
+            <a:r>
+              <a:rPr lang="en-GB" dirty="0" smtClean="0">
+                <a:latin typeface="Impact" panose="020B0806030902050204" pitchFamily="34" charset="0"/>
+              </a:rPr>
+              <a:t>Proposition</a:t>
+            </a:r>
+            <a:endParaRPr lang="en-GB" dirty="0">
+              <a:latin typeface="Impact" panose="020B0806030902050204" pitchFamily="34" charset="0"/>
+            </a:endParaRPr>
           </a:p>
         </p:txBody>
       </p:sp>
@@ -3111,6 +3295,41 @@
           </a:p>
         </p:txBody>
       </p:sp>
+      <p:pic>
+        <p:nvPicPr>
+          <p:cNvPr id="5" name="Picture 4"/>
+          <p:cNvPicPr>
+            <a:picLocks noChangeAspect="1"/>
+          </p:cNvPicPr>
+          <p:nvPr/>
+        </p:nvPicPr>
+        <p:blipFill rotWithShape="1">
+          <a:blip r:embed="rId3" cstate="print">
+            <a:extLst>
+              <a:ext uri="{28A0092B-C50C-407E-A947-70E740481C1C}">
+                <a14:useLocalDpi xmlns:a14="http://schemas.microsoft.com/office/drawing/2010/main" val="0"/>
+              </a:ext>
+            </a:extLst>
+          </a:blip>
+          <a:srcRect l="34290" t="30182" r="32033" b="39515"/>
+          <a:stretch/>
+        </p:blipFill>
+        <p:spPr>
+          <a:xfrm>
+            <a:off x="9711407" y="5126842"/>
+            <a:ext cx="2721379" cy="1731158"/>
+          </a:xfrm>
+          <a:prstGeom prst="rect">
+            <a:avLst/>
+          </a:prstGeom>
+          <a:scene3d>
+            <a:camera prst="orthographicFront">
+              <a:rot lat="0" lon="10799978" rev="0"/>
+            </a:camera>
+            <a:lightRig rig="threePt" dir="t"/>
+          </a:scene3d>
+        </p:spPr>
+      </p:pic>
     </p:spTree>
     <p:extLst>
       <p:ext uri="{BB962C8B-B14F-4D97-AF65-F5344CB8AC3E}">
@@ -3121,6 +3340,235 @@
   <p:clrMapOvr>
     <a:masterClrMapping/>
   </p:clrMapOvr>
+  <p:timing>
+    <p:tnLst>
+      <p:par>
+        <p:cTn id="1" dur="indefinite" restart="never" nodeType="tmRoot">
+          <p:childTnLst>
+            <p:seq concurrent="1" nextAc="seek">
+              <p:cTn id="2" dur="indefinite" nodeType="mainSeq">
+                <p:childTnLst>
+                  <p:par>
+                    <p:cTn id="3" fill="hold">
+                      <p:stCondLst>
+                        <p:cond delay="indefinite"/>
+                      </p:stCondLst>
+                      <p:childTnLst>
+                        <p:par>
+                          <p:cTn id="4" fill="hold">
+                            <p:stCondLst>
+                              <p:cond delay="0"/>
+                            </p:stCondLst>
+                            <p:childTnLst>
+                              <p:par>
+                                <p:cTn id="5" presetID="1" presetClass="entr" presetSubtype="0" fill="hold" grpId="0" nodeType="clickEffect">
+                                  <p:stCondLst>
+                                    <p:cond delay="0"/>
+                                  </p:stCondLst>
+                                  <p:childTnLst>
+                                    <p:set>
+                                      <p:cBhvr>
+                                        <p:cTn id="6" dur="1" fill="hold">
+                                          <p:stCondLst>
+                                            <p:cond delay="0"/>
+                                          </p:stCondLst>
+                                        </p:cTn>
+                                        <p:tgtEl>
+                                          <p:spTgt spid="3">
+                                            <p:txEl>
+                                              <p:pRg st="0" end="0"/>
+                                            </p:txEl>
+                                          </p:spTgt>
+                                        </p:tgtEl>
+                                        <p:attrNameLst>
+                                          <p:attrName>style.visibility</p:attrName>
+                                        </p:attrNameLst>
+                                      </p:cBhvr>
+                                      <p:to>
+                                        <p:strVal val="visible"/>
+                                      </p:to>
+                                    </p:set>
+                                  </p:childTnLst>
+                                </p:cTn>
+                              </p:par>
+                            </p:childTnLst>
+                          </p:cTn>
+                        </p:par>
+                      </p:childTnLst>
+                    </p:cTn>
+                  </p:par>
+                  <p:par>
+                    <p:cTn id="7" fill="hold">
+                      <p:stCondLst>
+                        <p:cond delay="indefinite"/>
+                      </p:stCondLst>
+                      <p:childTnLst>
+                        <p:par>
+                          <p:cTn id="8" fill="hold">
+                            <p:stCondLst>
+                              <p:cond delay="0"/>
+                            </p:stCondLst>
+                            <p:childTnLst>
+                              <p:par>
+                                <p:cTn id="9" presetID="1" presetClass="entr" presetSubtype="0" fill="hold" grpId="0" nodeType="clickEffect">
+                                  <p:stCondLst>
+                                    <p:cond delay="0"/>
+                                  </p:stCondLst>
+                                  <p:childTnLst>
+                                    <p:set>
+                                      <p:cBhvr>
+                                        <p:cTn id="10" dur="1" fill="hold">
+                                          <p:stCondLst>
+                                            <p:cond delay="0"/>
+                                          </p:stCondLst>
+                                        </p:cTn>
+                                        <p:tgtEl>
+                                          <p:spTgt spid="3">
+                                            <p:txEl>
+                                              <p:pRg st="1" end="1"/>
+                                            </p:txEl>
+                                          </p:spTgt>
+                                        </p:tgtEl>
+                                        <p:attrNameLst>
+                                          <p:attrName>style.visibility</p:attrName>
+                                        </p:attrNameLst>
+                                      </p:cBhvr>
+                                      <p:to>
+                                        <p:strVal val="visible"/>
+                                      </p:to>
+                                    </p:set>
+                                  </p:childTnLst>
+                                </p:cTn>
+                              </p:par>
+                            </p:childTnLst>
+                          </p:cTn>
+                        </p:par>
+                      </p:childTnLst>
+                    </p:cTn>
+                  </p:par>
+                  <p:par>
+                    <p:cTn id="11" fill="hold">
+                      <p:stCondLst>
+                        <p:cond delay="indefinite"/>
+                      </p:stCondLst>
+                      <p:childTnLst>
+                        <p:par>
+                          <p:cTn id="12" fill="hold">
+                            <p:stCondLst>
+                              <p:cond delay="0"/>
+                            </p:stCondLst>
+                            <p:childTnLst>
+                              <p:par>
+                                <p:cTn id="13" presetID="1" presetClass="entr" presetSubtype="0" fill="hold" grpId="0" nodeType="clickEffect">
+                                  <p:stCondLst>
+                                    <p:cond delay="0"/>
+                                  </p:stCondLst>
+                                  <p:childTnLst>
+                                    <p:set>
+                                      <p:cBhvr>
+                                        <p:cTn id="14" dur="1" fill="hold">
+                                          <p:stCondLst>
+                                            <p:cond delay="0"/>
+                                          </p:stCondLst>
+                                        </p:cTn>
+                                        <p:tgtEl>
+                                          <p:spTgt spid="3">
+                                            <p:txEl>
+                                              <p:pRg st="2" end="2"/>
+                                            </p:txEl>
+                                          </p:spTgt>
+                                        </p:tgtEl>
+                                        <p:attrNameLst>
+                                          <p:attrName>style.visibility</p:attrName>
+                                        </p:attrNameLst>
+                                      </p:cBhvr>
+                                      <p:to>
+                                        <p:strVal val="visible"/>
+                                      </p:to>
+                                    </p:set>
+                                  </p:childTnLst>
+                                </p:cTn>
+                              </p:par>
+                            </p:childTnLst>
+                          </p:cTn>
+                        </p:par>
+                      </p:childTnLst>
+                    </p:cTn>
+                  </p:par>
+                  <p:par>
+                    <p:cTn id="15" fill="hold">
+                      <p:stCondLst>
+                        <p:cond delay="indefinite"/>
+                      </p:stCondLst>
+                      <p:childTnLst>
+                        <p:par>
+                          <p:cTn id="16" fill="hold">
+                            <p:stCondLst>
+                              <p:cond delay="0"/>
+                            </p:stCondLst>
+                            <p:childTnLst>
+                              <p:par>
+                                <p:cTn id="17" presetID="1" presetClass="entr" presetSubtype="0" fill="hold" grpId="0" nodeType="clickEffect">
+                                  <p:stCondLst>
+                                    <p:cond delay="0"/>
+                                  </p:stCondLst>
+                                  <p:childTnLst>
+                                    <p:set>
+                                      <p:cBhvr>
+                                        <p:cTn id="18" dur="1" fill="hold">
+                                          <p:stCondLst>
+                                            <p:cond delay="0"/>
+                                          </p:stCondLst>
+                                        </p:cTn>
+                                        <p:tgtEl>
+                                          <p:spTgt spid="3">
+                                            <p:txEl>
+                                              <p:pRg st="3" end="3"/>
+                                            </p:txEl>
+                                          </p:spTgt>
+                                        </p:tgtEl>
+                                        <p:attrNameLst>
+                                          <p:attrName>style.visibility</p:attrName>
+                                        </p:attrNameLst>
+                                      </p:cBhvr>
+                                      <p:to>
+                                        <p:strVal val="visible"/>
+                                      </p:to>
+                                    </p:set>
+                                  </p:childTnLst>
+                                </p:cTn>
+                              </p:par>
+                            </p:childTnLst>
+                          </p:cTn>
+                        </p:par>
+                      </p:childTnLst>
+                    </p:cTn>
+                  </p:par>
+                </p:childTnLst>
+              </p:cTn>
+              <p:prevCondLst>
+                <p:cond evt="onPrev" delay="0">
+                  <p:tgtEl>
+                    <p:sldTgt/>
+                  </p:tgtEl>
+                </p:cond>
+              </p:prevCondLst>
+              <p:nextCondLst>
+                <p:cond evt="onNext" delay="0">
+                  <p:tgtEl>
+                    <p:sldTgt/>
+                  </p:tgtEl>
+                </p:cond>
+              </p:nextCondLst>
+            </p:seq>
+          </p:childTnLst>
+        </p:cTn>
+      </p:par>
+    </p:tnLst>
+    <p:bldLst>
+      <p:bldP spid="3" grpId="0" build="p"/>
+    </p:bldLst>
+  </p:timing>
 </p:sld>
 </file>
 
@@ -3141,6 +3589,43 @@
           <a:chExt cx="0" cy="0"/>
         </a:xfrm>
       </p:grpSpPr>
+      <p:pic>
+        <p:nvPicPr>
+          <p:cNvPr id="4" name="Picture 3"/>
+          <p:cNvPicPr>
+            <a:picLocks noChangeAspect="1"/>
+          </p:cNvPicPr>
+          <p:nvPr/>
+        </p:nvPicPr>
+        <p:blipFill>
+          <a:blip r:embed="rId2">
+            <a:duotone>
+              <a:schemeClr val="bg2">
+                <a:shade val="45000"/>
+                <a:satMod val="135000"/>
+              </a:schemeClr>
+              <a:prstClr val="white"/>
+            </a:duotone>
+            <a:extLst>
+              <a:ext uri="{28A0092B-C50C-407E-A947-70E740481C1C}">
+                <a14:useLocalDpi xmlns:a14="http://schemas.microsoft.com/office/drawing/2010/main" val="0"/>
+              </a:ext>
+            </a:extLst>
+          </a:blip>
+          <a:stretch>
+            <a:fillRect/>
+          </a:stretch>
+        </p:blipFill>
+        <p:spPr>
+          <a:xfrm>
+            <a:off x="-1898" y="0"/>
+            <a:ext cx="12192000" cy="6858000"/>
+          </a:xfrm>
+          <a:prstGeom prst="rect">
+            <a:avLst/>
+          </a:prstGeom>
+        </p:spPr>
+      </p:pic>
       <p:sp>
         <p:nvSpPr>
           <p:cNvPr id="2" name="Title 1"/>
@@ -3157,10 +3642,20 @@
           <a:lstStyle/>
           <a:p>
             <a:r>
-              <a:rPr lang="en-GB" dirty="0" smtClean="0"/>
-              <a:t>Publisher Prop</a:t>
-            </a:r>
-            <a:endParaRPr lang="en-GB" dirty="0"/>
+              <a:rPr lang="en-GB" dirty="0" smtClean="0">
+                <a:latin typeface="Impact" panose="020B0806030902050204" pitchFamily="34" charset="0"/>
+              </a:rPr>
+              <a:t>Publisher </a:t>
+            </a:r>
+            <a:r>
+              <a:rPr lang="en-GB" dirty="0" smtClean="0">
+                <a:latin typeface="Impact" panose="020B0806030902050204" pitchFamily="34" charset="0"/>
+              </a:rPr>
+              <a:t>Proposition</a:t>
+            </a:r>
+            <a:endParaRPr lang="en-GB" dirty="0">
+              <a:latin typeface="Impact" panose="020B0806030902050204" pitchFamily="34" charset="0"/>
+            </a:endParaRPr>
           </a:p>
         </p:txBody>
       </p:sp>
@@ -3221,6 +3716,41 @@
           </a:p>
         </p:txBody>
       </p:sp>
+      <p:pic>
+        <p:nvPicPr>
+          <p:cNvPr id="5" name="Picture 4"/>
+          <p:cNvPicPr>
+            <a:picLocks noChangeAspect="1"/>
+          </p:cNvPicPr>
+          <p:nvPr/>
+        </p:nvPicPr>
+        <p:blipFill rotWithShape="1">
+          <a:blip r:embed="rId3" cstate="print">
+            <a:extLst>
+              <a:ext uri="{28A0092B-C50C-407E-A947-70E740481C1C}">
+                <a14:useLocalDpi xmlns:a14="http://schemas.microsoft.com/office/drawing/2010/main" val="0"/>
+              </a:ext>
+            </a:extLst>
+          </a:blip>
+          <a:srcRect l="34290" t="30182" r="32033" b="39515"/>
+          <a:stretch/>
+        </p:blipFill>
+        <p:spPr>
+          <a:xfrm>
+            <a:off x="9711407" y="5126842"/>
+            <a:ext cx="2721379" cy="1731158"/>
+          </a:xfrm>
+          <a:prstGeom prst="rect">
+            <a:avLst/>
+          </a:prstGeom>
+          <a:scene3d>
+            <a:camera prst="orthographicFront">
+              <a:rot lat="0" lon="10799978" rev="0"/>
+            </a:camera>
+            <a:lightRig rig="threePt" dir="t"/>
+          </a:scene3d>
+        </p:spPr>
+      </p:pic>
     </p:spTree>
     <p:extLst>
       <p:ext uri="{BB962C8B-B14F-4D97-AF65-F5344CB8AC3E}">
@@ -3231,6 +3761,333 @@
   <p:clrMapOvr>
     <a:masterClrMapping/>
   </p:clrMapOvr>
+  <p:timing>
+    <p:tnLst>
+      <p:par>
+        <p:cTn id="1" dur="indefinite" restart="never" nodeType="tmRoot">
+          <p:childTnLst>
+            <p:seq concurrent="1" nextAc="seek">
+              <p:cTn id="2" dur="indefinite" nodeType="mainSeq">
+                <p:childTnLst>
+                  <p:par>
+                    <p:cTn id="3" fill="hold">
+                      <p:stCondLst>
+                        <p:cond delay="indefinite"/>
+                      </p:stCondLst>
+                      <p:childTnLst>
+                        <p:par>
+                          <p:cTn id="4" fill="hold">
+                            <p:stCondLst>
+                              <p:cond delay="0"/>
+                            </p:stCondLst>
+                            <p:childTnLst>
+                              <p:par>
+                                <p:cTn id="5" presetID="1" presetClass="entr" presetSubtype="0" fill="hold" grpId="0" nodeType="clickEffect">
+                                  <p:stCondLst>
+                                    <p:cond delay="0"/>
+                                  </p:stCondLst>
+                                  <p:childTnLst>
+                                    <p:set>
+                                      <p:cBhvr>
+                                        <p:cTn id="6" dur="1" fill="hold">
+                                          <p:stCondLst>
+                                            <p:cond delay="0"/>
+                                          </p:stCondLst>
+                                        </p:cTn>
+                                        <p:tgtEl>
+                                          <p:spTgt spid="3">
+                                            <p:txEl>
+                                              <p:pRg st="0" end="0"/>
+                                            </p:txEl>
+                                          </p:spTgt>
+                                        </p:tgtEl>
+                                        <p:attrNameLst>
+                                          <p:attrName>style.visibility</p:attrName>
+                                        </p:attrNameLst>
+                                      </p:cBhvr>
+                                      <p:to>
+                                        <p:strVal val="visible"/>
+                                      </p:to>
+                                    </p:set>
+                                  </p:childTnLst>
+                                </p:cTn>
+                              </p:par>
+                            </p:childTnLst>
+                          </p:cTn>
+                        </p:par>
+                      </p:childTnLst>
+                    </p:cTn>
+                  </p:par>
+                  <p:par>
+                    <p:cTn id="7" fill="hold">
+                      <p:stCondLst>
+                        <p:cond delay="indefinite"/>
+                      </p:stCondLst>
+                      <p:childTnLst>
+                        <p:par>
+                          <p:cTn id="8" fill="hold">
+                            <p:stCondLst>
+                              <p:cond delay="0"/>
+                            </p:stCondLst>
+                            <p:childTnLst>
+                              <p:par>
+                                <p:cTn id="9" presetID="1" presetClass="entr" presetSubtype="0" fill="hold" grpId="0" nodeType="clickEffect">
+                                  <p:stCondLst>
+                                    <p:cond delay="0"/>
+                                  </p:stCondLst>
+                                  <p:childTnLst>
+                                    <p:set>
+                                      <p:cBhvr>
+                                        <p:cTn id="10" dur="1" fill="hold">
+                                          <p:stCondLst>
+                                            <p:cond delay="0"/>
+                                          </p:stCondLst>
+                                        </p:cTn>
+                                        <p:tgtEl>
+                                          <p:spTgt spid="3">
+                                            <p:txEl>
+                                              <p:pRg st="1" end="1"/>
+                                            </p:txEl>
+                                          </p:spTgt>
+                                        </p:tgtEl>
+                                        <p:attrNameLst>
+                                          <p:attrName>style.visibility</p:attrName>
+                                        </p:attrNameLst>
+                                      </p:cBhvr>
+                                      <p:to>
+                                        <p:strVal val="visible"/>
+                                      </p:to>
+                                    </p:set>
+                                  </p:childTnLst>
+                                </p:cTn>
+                              </p:par>
+                            </p:childTnLst>
+                          </p:cTn>
+                        </p:par>
+                      </p:childTnLst>
+                    </p:cTn>
+                  </p:par>
+                  <p:par>
+                    <p:cTn id="11" fill="hold">
+                      <p:stCondLst>
+                        <p:cond delay="indefinite"/>
+                      </p:stCondLst>
+                      <p:childTnLst>
+                        <p:par>
+                          <p:cTn id="12" fill="hold">
+                            <p:stCondLst>
+                              <p:cond delay="0"/>
+                            </p:stCondLst>
+                            <p:childTnLst>
+                              <p:par>
+                                <p:cTn id="13" presetID="1" presetClass="entr" presetSubtype="0" fill="hold" grpId="0" nodeType="clickEffect">
+                                  <p:stCondLst>
+                                    <p:cond delay="0"/>
+                                  </p:stCondLst>
+                                  <p:childTnLst>
+                                    <p:set>
+                                      <p:cBhvr>
+                                        <p:cTn id="14" dur="1" fill="hold">
+                                          <p:stCondLst>
+                                            <p:cond delay="0"/>
+                                          </p:stCondLst>
+                                        </p:cTn>
+                                        <p:tgtEl>
+                                          <p:spTgt spid="3">
+                                            <p:txEl>
+                                              <p:pRg st="2" end="2"/>
+                                            </p:txEl>
+                                          </p:spTgt>
+                                        </p:tgtEl>
+                                        <p:attrNameLst>
+                                          <p:attrName>style.visibility</p:attrName>
+                                        </p:attrNameLst>
+                                      </p:cBhvr>
+                                      <p:to>
+                                        <p:strVal val="visible"/>
+                                      </p:to>
+                                    </p:set>
+                                  </p:childTnLst>
+                                </p:cTn>
+                              </p:par>
+                            </p:childTnLst>
+                          </p:cTn>
+                        </p:par>
+                      </p:childTnLst>
+                    </p:cTn>
+                  </p:par>
+                  <p:par>
+                    <p:cTn id="15" fill="hold">
+                      <p:stCondLst>
+                        <p:cond delay="indefinite"/>
+                      </p:stCondLst>
+                      <p:childTnLst>
+                        <p:par>
+                          <p:cTn id="16" fill="hold">
+                            <p:stCondLst>
+                              <p:cond delay="0"/>
+                            </p:stCondLst>
+                            <p:childTnLst>
+                              <p:par>
+                                <p:cTn id="17" presetID="1" presetClass="entr" presetSubtype="0" fill="hold" grpId="0" nodeType="clickEffect">
+                                  <p:stCondLst>
+                                    <p:cond delay="0"/>
+                                  </p:stCondLst>
+                                  <p:childTnLst>
+                                    <p:set>
+                                      <p:cBhvr>
+                                        <p:cTn id="18" dur="1" fill="hold">
+                                          <p:stCondLst>
+                                            <p:cond delay="0"/>
+                                          </p:stCondLst>
+                                        </p:cTn>
+                                        <p:tgtEl>
+                                          <p:spTgt spid="3">
+                                            <p:txEl>
+                                              <p:pRg st="3" end="3"/>
+                                            </p:txEl>
+                                          </p:spTgt>
+                                        </p:tgtEl>
+                                        <p:attrNameLst>
+                                          <p:attrName>style.visibility</p:attrName>
+                                        </p:attrNameLst>
+                                      </p:cBhvr>
+                                      <p:to>
+                                        <p:strVal val="visible"/>
+                                      </p:to>
+                                    </p:set>
+                                  </p:childTnLst>
+                                </p:cTn>
+                              </p:par>
+                            </p:childTnLst>
+                          </p:cTn>
+                        </p:par>
+                      </p:childTnLst>
+                    </p:cTn>
+                  </p:par>
+                  <p:par>
+                    <p:cTn id="19" fill="hold">
+                      <p:stCondLst>
+                        <p:cond delay="indefinite"/>
+                      </p:stCondLst>
+                      <p:childTnLst>
+                        <p:par>
+                          <p:cTn id="20" fill="hold">
+                            <p:stCondLst>
+                              <p:cond delay="0"/>
+                            </p:stCondLst>
+                            <p:childTnLst>
+                              <p:par>
+                                <p:cTn id="21" presetID="1" presetClass="entr" presetSubtype="0" fill="hold" grpId="0" nodeType="clickEffect">
+                                  <p:stCondLst>
+                                    <p:cond delay="0"/>
+                                  </p:stCondLst>
+                                  <p:childTnLst>
+                                    <p:set>
+                                      <p:cBhvr>
+                                        <p:cTn id="22" dur="1" fill="hold">
+                                          <p:stCondLst>
+                                            <p:cond delay="0"/>
+                                          </p:stCondLst>
+                                        </p:cTn>
+                                        <p:tgtEl>
+                                          <p:spTgt spid="3">
+                                            <p:txEl>
+                                              <p:pRg st="4" end="4"/>
+                                            </p:txEl>
+                                          </p:spTgt>
+                                        </p:tgtEl>
+                                        <p:attrNameLst>
+                                          <p:attrName>style.visibility</p:attrName>
+                                        </p:attrNameLst>
+                                      </p:cBhvr>
+                                      <p:to>
+                                        <p:strVal val="visible"/>
+                                      </p:to>
+                                    </p:set>
+                                  </p:childTnLst>
+                                </p:cTn>
+                              </p:par>
+                            </p:childTnLst>
+                          </p:cTn>
+                        </p:par>
+                      </p:childTnLst>
+                    </p:cTn>
+                  </p:par>
+                  <p:par>
+                    <p:cTn id="23" fill="hold">
+                      <p:stCondLst>
+                        <p:cond delay="indefinite"/>
+                      </p:stCondLst>
+                      <p:childTnLst>
+                        <p:par>
+                          <p:cTn id="24" fill="hold">
+                            <p:stCondLst>
+                              <p:cond delay="0"/>
+                            </p:stCondLst>
+                            <p:childTnLst>
+                              <p:par>
+                                <p:cTn id="25" presetID="1" presetClass="entr" presetSubtype="0" fill="hold" grpId="0" nodeType="clickEffect">
+                                  <p:stCondLst>
+                                    <p:cond delay="0"/>
+                                  </p:stCondLst>
+                                  <p:childTnLst>
+                                    <p:set>
+                                      <p:cBhvr>
+                                        <p:cTn id="26" dur="1" fill="hold">
+                                          <p:stCondLst>
+                                            <p:cond delay="0"/>
+                                          </p:stCondLst>
+                                        </p:cTn>
+                                        <p:tgtEl>
+                                          <p:spTgt spid="3">
+                                            <p:txEl>
+                                              <p:pRg st="5" end="5"/>
+                                            </p:txEl>
+                                          </p:spTgt>
+                                        </p:tgtEl>
+                                        <p:attrNameLst>
+                                          <p:attrName>style.visibility</p:attrName>
+                                        </p:attrNameLst>
+                                      </p:cBhvr>
+                                      <p:to>
+                                        <p:strVal val="visible"/>
+                                      </p:to>
+                                    </p:set>
+                                  </p:childTnLst>
+                                </p:cTn>
+                              </p:par>
+                            </p:childTnLst>
+                          </p:cTn>
+                        </p:par>
+                      </p:childTnLst>
+                    </p:cTn>
+                  </p:par>
+                </p:childTnLst>
+              </p:cTn>
+              <p:prevCondLst>
+                <p:cond evt="onPrev" delay="0">
+                  <p:tgtEl>
+                    <p:sldTgt/>
+                  </p:tgtEl>
+                </p:cond>
+              </p:prevCondLst>
+              <p:nextCondLst>
+                <p:cond evt="onNext" delay="0">
+                  <p:tgtEl>
+                    <p:sldTgt/>
+                  </p:tgtEl>
+                </p:cond>
+              </p:nextCondLst>
+            </p:seq>
+          </p:childTnLst>
+        </p:cTn>
+      </p:par>
+    </p:tnLst>
+    <p:bldLst>
+      <p:bldP spid="3" grpId="0" build="p"/>
+    </p:bldLst>
+  </p:timing>
 </p:sld>
 </file>
 
@@ -3251,6 +4108,43 @@
           <a:chExt cx="0" cy="0"/>
         </a:xfrm>
       </p:grpSpPr>
+      <p:pic>
+        <p:nvPicPr>
+          <p:cNvPr id="4" name="Picture 3"/>
+          <p:cNvPicPr>
+            <a:picLocks noChangeAspect="1"/>
+          </p:cNvPicPr>
+          <p:nvPr/>
+        </p:nvPicPr>
+        <p:blipFill>
+          <a:blip r:embed="rId2">
+            <a:duotone>
+              <a:schemeClr val="bg2">
+                <a:shade val="45000"/>
+                <a:satMod val="135000"/>
+              </a:schemeClr>
+              <a:prstClr val="white"/>
+            </a:duotone>
+            <a:extLst>
+              <a:ext uri="{28A0092B-C50C-407E-A947-70E740481C1C}">
+                <a14:useLocalDpi xmlns:a14="http://schemas.microsoft.com/office/drawing/2010/main" val="0"/>
+              </a:ext>
+            </a:extLst>
+          </a:blip>
+          <a:stretch>
+            <a:fillRect/>
+          </a:stretch>
+        </p:blipFill>
+        <p:spPr>
+          <a:xfrm>
+            <a:off x="-1898" y="0"/>
+            <a:ext cx="12192000" cy="6858000"/>
+          </a:xfrm>
+          <a:prstGeom prst="rect">
+            <a:avLst/>
+          </a:prstGeom>
+        </p:spPr>
+      </p:pic>
       <p:sp>
         <p:nvSpPr>
           <p:cNvPr id="2" name="Title 1"/>
@@ -3267,10 +4161,14 @@
           <a:lstStyle/>
           <a:p>
             <a:r>
-              <a:rPr lang="en-GB" dirty="0" smtClean="0"/>
+              <a:rPr lang="en-GB" dirty="0" smtClean="0">
+                <a:latin typeface="Impact" panose="020B0806030902050204" pitchFamily="34" charset="0"/>
+              </a:rPr>
               <a:t>Self Publishing Finances</a:t>
             </a:r>
-            <a:endParaRPr lang="en-GB" dirty="0"/>
+            <a:endParaRPr lang="en-GB" dirty="0">
+              <a:latin typeface="Impact" panose="020B0806030902050204" pitchFamily="34" charset="0"/>
+            </a:endParaRPr>
           </a:p>
         </p:txBody>
       </p:sp>
@@ -3335,6 +4233,41 @@
           </a:p>
         </p:txBody>
       </p:sp>
+      <p:pic>
+        <p:nvPicPr>
+          <p:cNvPr id="5" name="Picture 4"/>
+          <p:cNvPicPr>
+            <a:picLocks noChangeAspect="1"/>
+          </p:cNvPicPr>
+          <p:nvPr/>
+        </p:nvPicPr>
+        <p:blipFill rotWithShape="1">
+          <a:blip r:embed="rId3" cstate="print">
+            <a:extLst>
+              <a:ext uri="{28A0092B-C50C-407E-A947-70E740481C1C}">
+                <a14:useLocalDpi xmlns:a14="http://schemas.microsoft.com/office/drawing/2010/main" val="0"/>
+              </a:ext>
+            </a:extLst>
+          </a:blip>
+          <a:srcRect l="34290" t="30182" r="32033" b="39515"/>
+          <a:stretch/>
+        </p:blipFill>
+        <p:spPr>
+          <a:xfrm>
+            <a:off x="9711407" y="5126842"/>
+            <a:ext cx="2721379" cy="1731158"/>
+          </a:xfrm>
+          <a:prstGeom prst="rect">
+            <a:avLst/>
+          </a:prstGeom>
+          <a:scene3d>
+            <a:camera prst="orthographicFront">
+              <a:rot lat="0" lon="10799978" rev="0"/>
+            </a:camera>
+            <a:lightRig rig="threePt" dir="t"/>
+          </a:scene3d>
+        </p:spPr>
+      </p:pic>
     </p:spTree>
     <p:extLst>
       <p:ext uri="{BB962C8B-B14F-4D97-AF65-F5344CB8AC3E}">
@@ -3345,6 +4278,333 @@
   <p:clrMapOvr>
     <a:masterClrMapping/>
   </p:clrMapOvr>
+  <p:timing>
+    <p:tnLst>
+      <p:par>
+        <p:cTn id="1" dur="indefinite" restart="never" nodeType="tmRoot">
+          <p:childTnLst>
+            <p:seq concurrent="1" nextAc="seek">
+              <p:cTn id="2" dur="indefinite" nodeType="mainSeq">
+                <p:childTnLst>
+                  <p:par>
+                    <p:cTn id="3" fill="hold">
+                      <p:stCondLst>
+                        <p:cond delay="indefinite"/>
+                      </p:stCondLst>
+                      <p:childTnLst>
+                        <p:par>
+                          <p:cTn id="4" fill="hold">
+                            <p:stCondLst>
+                              <p:cond delay="0"/>
+                            </p:stCondLst>
+                            <p:childTnLst>
+                              <p:par>
+                                <p:cTn id="5" presetID="1" presetClass="entr" presetSubtype="0" fill="hold" grpId="0" nodeType="clickEffect">
+                                  <p:stCondLst>
+                                    <p:cond delay="0"/>
+                                  </p:stCondLst>
+                                  <p:childTnLst>
+                                    <p:set>
+                                      <p:cBhvr>
+                                        <p:cTn id="6" dur="1" fill="hold">
+                                          <p:stCondLst>
+                                            <p:cond delay="0"/>
+                                          </p:stCondLst>
+                                        </p:cTn>
+                                        <p:tgtEl>
+                                          <p:spTgt spid="3">
+                                            <p:txEl>
+                                              <p:pRg st="0" end="0"/>
+                                            </p:txEl>
+                                          </p:spTgt>
+                                        </p:tgtEl>
+                                        <p:attrNameLst>
+                                          <p:attrName>style.visibility</p:attrName>
+                                        </p:attrNameLst>
+                                      </p:cBhvr>
+                                      <p:to>
+                                        <p:strVal val="visible"/>
+                                      </p:to>
+                                    </p:set>
+                                  </p:childTnLst>
+                                </p:cTn>
+                              </p:par>
+                            </p:childTnLst>
+                          </p:cTn>
+                        </p:par>
+                      </p:childTnLst>
+                    </p:cTn>
+                  </p:par>
+                  <p:par>
+                    <p:cTn id="7" fill="hold">
+                      <p:stCondLst>
+                        <p:cond delay="indefinite"/>
+                      </p:stCondLst>
+                      <p:childTnLst>
+                        <p:par>
+                          <p:cTn id="8" fill="hold">
+                            <p:stCondLst>
+                              <p:cond delay="0"/>
+                            </p:stCondLst>
+                            <p:childTnLst>
+                              <p:par>
+                                <p:cTn id="9" presetID="1" presetClass="entr" presetSubtype="0" fill="hold" grpId="0" nodeType="clickEffect">
+                                  <p:stCondLst>
+                                    <p:cond delay="0"/>
+                                  </p:stCondLst>
+                                  <p:childTnLst>
+                                    <p:set>
+                                      <p:cBhvr>
+                                        <p:cTn id="10" dur="1" fill="hold">
+                                          <p:stCondLst>
+                                            <p:cond delay="0"/>
+                                          </p:stCondLst>
+                                        </p:cTn>
+                                        <p:tgtEl>
+                                          <p:spTgt spid="3">
+                                            <p:txEl>
+                                              <p:pRg st="1" end="1"/>
+                                            </p:txEl>
+                                          </p:spTgt>
+                                        </p:tgtEl>
+                                        <p:attrNameLst>
+                                          <p:attrName>style.visibility</p:attrName>
+                                        </p:attrNameLst>
+                                      </p:cBhvr>
+                                      <p:to>
+                                        <p:strVal val="visible"/>
+                                      </p:to>
+                                    </p:set>
+                                  </p:childTnLst>
+                                </p:cTn>
+                              </p:par>
+                            </p:childTnLst>
+                          </p:cTn>
+                        </p:par>
+                      </p:childTnLst>
+                    </p:cTn>
+                  </p:par>
+                  <p:par>
+                    <p:cTn id="11" fill="hold">
+                      <p:stCondLst>
+                        <p:cond delay="indefinite"/>
+                      </p:stCondLst>
+                      <p:childTnLst>
+                        <p:par>
+                          <p:cTn id="12" fill="hold">
+                            <p:stCondLst>
+                              <p:cond delay="0"/>
+                            </p:stCondLst>
+                            <p:childTnLst>
+                              <p:par>
+                                <p:cTn id="13" presetID="1" presetClass="entr" presetSubtype="0" fill="hold" grpId="0" nodeType="clickEffect">
+                                  <p:stCondLst>
+                                    <p:cond delay="0"/>
+                                  </p:stCondLst>
+                                  <p:childTnLst>
+                                    <p:set>
+                                      <p:cBhvr>
+                                        <p:cTn id="14" dur="1" fill="hold">
+                                          <p:stCondLst>
+                                            <p:cond delay="0"/>
+                                          </p:stCondLst>
+                                        </p:cTn>
+                                        <p:tgtEl>
+                                          <p:spTgt spid="3">
+                                            <p:txEl>
+                                              <p:pRg st="2" end="2"/>
+                                            </p:txEl>
+                                          </p:spTgt>
+                                        </p:tgtEl>
+                                        <p:attrNameLst>
+                                          <p:attrName>style.visibility</p:attrName>
+                                        </p:attrNameLst>
+                                      </p:cBhvr>
+                                      <p:to>
+                                        <p:strVal val="visible"/>
+                                      </p:to>
+                                    </p:set>
+                                  </p:childTnLst>
+                                </p:cTn>
+                              </p:par>
+                            </p:childTnLst>
+                          </p:cTn>
+                        </p:par>
+                      </p:childTnLst>
+                    </p:cTn>
+                  </p:par>
+                  <p:par>
+                    <p:cTn id="15" fill="hold">
+                      <p:stCondLst>
+                        <p:cond delay="indefinite"/>
+                      </p:stCondLst>
+                      <p:childTnLst>
+                        <p:par>
+                          <p:cTn id="16" fill="hold">
+                            <p:stCondLst>
+                              <p:cond delay="0"/>
+                            </p:stCondLst>
+                            <p:childTnLst>
+                              <p:par>
+                                <p:cTn id="17" presetID="1" presetClass="entr" presetSubtype="0" fill="hold" grpId="0" nodeType="clickEffect">
+                                  <p:stCondLst>
+                                    <p:cond delay="0"/>
+                                  </p:stCondLst>
+                                  <p:childTnLst>
+                                    <p:set>
+                                      <p:cBhvr>
+                                        <p:cTn id="18" dur="1" fill="hold">
+                                          <p:stCondLst>
+                                            <p:cond delay="0"/>
+                                          </p:stCondLst>
+                                        </p:cTn>
+                                        <p:tgtEl>
+                                          <p:spTgt spid="3">
+                                            <p:txEl>
+                                              <p:pRg st="4" end="4"/>
+                                            </p:txEl>
+                                          </p:spTgt>
+                                        </p:tgtEl>
+                                        <p:attrNameLst>
+                                          <p:attrName>style.visibility</p:attrName>
+                                        </p:attrNameLst>
+                                      </p:cBhvr>
+                                      <p:to>
+                                        <p:strVal val="visible"/>
+                                      </p:to>
+                                    </p:set>
+                                  </p:childTnLst>
+                                </p:cTn>
+                              </p:par>
+                            </p:childTnLst>
+                          </p:cTn>
+                        </p:par>
+                      </p:childTnLst>
+                    </p:cTn>
+                  </p:par>
+                  <p:par>
+                    <p:cTn id="19" fill="hold">
+                      <p:stCondLst>
+                        <p:cond delay="indefinite"/>
+                      </p:stCondLst>
+                      <p:childTnLst>
+                        <p:par>
+                          <p:cTn id="20" fill="hold">
+                            <p:stCondLst>
+                              <p:cond delay="0"/>
+                            </p:stCondLst>
+                            <p:childTnLst>
+                              <p:par>
+                                <p:cTn id="21" presetID="1" presetClass="entr" presetSubtype="0" fill="hold" grpId="0" nodeType="clickEffect">
+                                  <p:stCondLst>
+                                    <p:cond delay="0"/>
+                                  </p:stCondLst>
+                                  <p:childTnLst>
+                                    <p:set>
+                                      <p:cBhvr>
+                                        <p:cTn id="22" dur="1" fill="hold">
+                                          <p:stCondLst>
+                                            <p:cond delay="0"/>
+                                          </p:stCondLst>
+                                        </p:cTn>
+                                        <p:tgtEl>
+                                          <p:spTgt spid="3">
+                                            <p:txEl>
+                                              <p:pRg st="5" end="5"/>
+                                            </p:txEl>
+                                          </p:spTgt>
+                                        </p:tgtEl>
+                                        <p:attrNameLst>
+                                          <p:attrName>style.visibility</p:attrName>
+                                        </p:attrNameLst>
+                                      </p:cBhvr>
+                                      <p:to>
+                                        <p:strVal val="visible"/>
+                                      </p:to>
+                                    </p:set>
+                                  </p:childTnLst>
+                                </p:cTn>
+                              </p:par>
+                            </p:childTnLst>
+                          </p:cTn>
+                        </p:par>
+                      </p:childTnLst>
+                    </p:cTn>
+                  </p:par>
+                  <p:par>
+                    <p:cTn id="23" fill="hold">
+                      <p:stCondLst>
+                        <p:cond delay="indefinite"/>
+                      </p:stCondLst>
+                      <p:childTnLst>
+                        <p:par>
+                          <p:cTn id="24" fill="hold">
+                            <p:stCondLst>
+                              <p:cond delay="0"/>
+                            </p:stCondLst>
+                            <p:childTnLst>
+                              <p:par>
+                                <p:cTn id="25" presetID="1" presetClass="entr" presetSubtype="0" fill="hold" grpId="0" nodeType="clickEffect">
+                                  <p:stCondLst>
+                                    <p:cond delay="0"/>
+                                  </p:stCondLst>
+                                  <p:childTnLst>
+                                    <p:set>
+                                      <p:cBhvr>
+                                        <p:cTn id="26" dur="1" fill="hold">
+                                          <p:stCondLst>
+                                            <p:cond delay="0"/>
+                                          </p:stCondLst>
+                                        </p:cTn>
+                                        <p:tgtEl>
+                                          <p:spTgt spid="3">
+                                            <p:txEl>
+                                              <p:pRg st="7" end="7"/>
+                                            </p:txEl>
+                                          </p:spTgt>
+                                        </p:tgtEl>
+                                        <p:attrNameLst>
+                                          <p:attrName>style.visibility</p:attrName>
+                                        </p:attrNameLst>
+                                      </p:cBhvr>
+                                      <p:to>
+                                        <p:strVal val="visible"/>
+                                      </p:to>
+                                    </p:set>
+                                  </p:childTnLst>
+                                </p:cTn>
+                              </p:par>
+                            </p:childTnLst>
+                          </p:cTn>
+                        </p:par>
+                      </p:childTnLst>
+                    </p:cTn>
+                  </p:par>
+                </p:childTnLst>
+              </p:cTn>
+              <p:prevCondLst>
+                <p:cond evt="onPrev" delay="0">
+                  <p:tgtEl>
+                    <p:sldTgt/>
+                  </p:tgtEl>
+                </p:cond>
+              </p:prevCondLst>
+              <p:nextCondLst>
+                <p:cond evt="onNext" delay="0">
+                  <p:tgtEl>
+                    <p:sldTgt/>
+                  </p:tgtEl>
+                </p:cond>
+              </p:nextCondLst>
+            </p:seq>
+          </p:childTnLst>
+        </p:cTn>
+      </p:par>
+    </p:tnLst>
+    <p:bldLst>
+      <p:bldP spid="3" grpId="0" build="p"/>
+    </p:bldLst>
+  </p:timing>
 </p:sld>
 </file>
 
@@ -3365,6 +4625,43 @@
           <a:chExt cx="0" cy="0"/>
         </a:xfrm>
       </p:grpSpPr>
+      <p:pic>
+        <p:nvPicPr>
+          <p:cNvPr id="4" name="Picture 3"/>
+          <p:cNvPicPr>
+            <a:picLocks noChangeAspect="1"/>
+          </p:cNvPicPr>
+          <p:nvPr/>
+        </p:nvPicPr>
+        <p:blipFill>
+          <a:blip r:embed="rId2">
+            <a:duotone>
+              <a:schemeClr val="bg2">
+                <a:shade val="45000"/>
+                <a:satMod val="135000"/>
+              </a:schemeClr>
+              <a:prstClr val="white"/>
+            </a:duotone>
+            <a:extLst>
+              <a:ext uri="{28A0092B-C50C-407E-A947-70E740481C1C}">
+                <a14:useLocalDpi xmlns:a14="http://schemas.microsoft.com/office/drawing/2010/main" val="0"/>
+              </a:ext>
+            </a:extLst>
+          </a:blip>
+          <a:stretch>
+            <a:fillRect/>
+          </a:stretch>
+        </p:blipFill>
+        <p:spPr>
+          <a:xfrm>
+            <a:off x="-1898" y="0"/>
+            <a:ext cx="12192000" cy="6858000"/>
+          </a:xfrm>
+          <a:prstGeom prst="rect">
+            <a:avLst/>
+          </a:prstGeom>
+        </p:spPr>
+      </p:pic>
       <p:sp>
         <p:nvSpPr>
           <p:cNvPr id="2" name="Title 1"/>
@@ -3381,10 +4678,14 @@
           <a:lstStyle/>
           <a:p>
             <a:r>
-              <a:rPr lang="en-GB" dirty="0" smtClean="0"/>
+              <a:rPr lang="en-GB" dirty="0" smtClean="0">
+                <a:latin typeface="Impact" panose="020B0806030902050204" pitchFamily="34" charset="0"/>
+              </a:rPr>
               <a:t>Publisher Finances</a:t>
             </a:r>
-            <a:endParaRPr lang="en-GB" dirty="0"/>
+            <a:endParaRPr lang="en-GB" dirty="0">
+              <a:latin typeface="Impact" panose="020B0806030902050204" pitchFamily="34" charset="0"/>
+            </a:endParaRPr>
           </a:p>
         </p:txBody>
       </p:sp>
@@ -3426,7 +4727,6 @@
               <a:rPr lang="en-GB" sz="3000" dirty="0" smtClean="0"/>
               <a:t>Low risk for the company</a:t>
             </a:r>
-            <a:endParaRPr lang="en-GB" sz="3000" dirty="0" smtClean="0"/>
           </a:p>
           <a:p>
             <a:r>
@@ -3466,6 +4766,41 @@
           </a:p>
         </p:txBody>
       </p:sp>
+      <p:pic>
+        <p:nvPicPr>
+          <p:cNvPr id="5" name="Picture 4"/>
+          <p:cNvPicPr>
+            <a:picLocks noChangeAspect="1"/>
+          </p:cNvPicPr>
+          <p:nvPr/>
+        </p:nvPicPr>
+        <p:blipFill rotWithShape="1">
+          <a:blip r:embed="rId3" cstate="print">
+            <a:extLst>
+              <a:ext uri="{28A0092B-C50C-407E-A947-70E740481C1C}">
+                <a14:useLocalDpi xmlns:a14="http://schemas.microsoft.com/office/drawing/2010/main" val="0"/>
+              </a:ext>
+            </a:extLst>
+          </a:blip>
+          <a:srcRect l="34290" t="30182" r="32033" b="39515"/>
+          <a:stretch/>
+        </p:blipFill>
+        <p:spPr>
+          <a:xfrm>
+            <a:off x="9711407" y="5126842"/>
+            <a:ext cx="2721379" cy="1731158"/>
+          </a:xfrm>
+          <a:prstGeom prst="rect">
+            <a:avLst/>
+          </a:prstGeom>
+          <a:scene3d>
+            <a:camera prst="orthographicFront">
+              <a:rot lat="0" lon="10799978" rev="0"/>
+            </a:camera>
+            <a:lightRig rig="threePt" dir="t"/>
+          </a:scene3d>
+        </p:spPr>
+      </p:pic>
     </p:spTree>
     <p:extLst>
       <p:ext uri="{BB962C8B-B14F-4D97-AF65-F5344CB8AC3E}">
@@ -3476,6 +4811,480 @@
   <p:clrMapOvr>
     <a:masterClrMapping/>
   </p:clrMapOvr>
+  <p:timing>
+    <p:tnLst>
+      <p:par>
+        <p:cTn id="1" dur="indefinite" restart="never" nodeType="tmRoot">
+          <p:childTnLst>
+            <p:seq concurrent="1" nextAc="seek">
+              <p:cTn id="2" dur="indefinite" nodeType="mainSeq">
+                <p:childTnLst>
+                  <p:par>
+                    <p:cTn id="3" fill="hold">
+                      <p:stCondLst>
+                        <p:cond delay="indefinite"/>
+                      </p:stCondLst>
+                      <p:childTnLst>
+                        <p:par>
+                          <p:cTn id="4" fill="hold">
+                            <p:stCondLst>
+                              <p:cond delay="0"/>
+                            </p:stCondLst>
+                            <p:childTnLst>
+                              <p:par>
+                                <p:cTn id="5" presetID="1" presetClass="entr" presetSubtype="0" fill="hold" grpId="0" nodeType="clickEffect">
+                                  <p:stCondLst>
+                                    <p:cond delay="0"/>
+                                  </p:stCondLst>
+                                  <p:childTnLst>
+                                    <p:set>
+                                      <p:cBhvr>
+                                        <p:cTn id="6" dur="1" fill="hold">
+                                          <p:stCondLst>
+                                            <p:cond delay="0"/>
+                                          </p:stCondLst>
+                                        </p:cTn>
+                                        <p:tgtEl>
+                                          <p:spTgt spid="3">
+                                            <p:txEl>
+                                              <p:pRg st="0" end="0"/>
+                                            </p:txEl>
+                                          </p:spTgt>
+                                        </p:tgtEl>
+                                        <p:attrNameLst>
+                                          <p:attrName>style.visibility</p:attrName>
+                                        </p:attrNameLst>
+                                      </p:cBhvr>
+                                      <p:to>
+                                        <p:strVal val="visible"/>
+                                      </p:to>
+                                    </p:set>
+                                  </p:childTnLst>
+                                </p:cTn>
+                              </p:par>
+                            </p:childTnLst>
+                          </p:cTn>
+                        </p:par>
+                      </p:childTnLst>
+                    </p:cTn>
+                  </p:par>
+                  <p:par>
+                    <p:cTn id="7" fill="hold">
+                      <p:stCondLst>
+                        <p:cond delay="indefinite"/>
+                      </p:stCondLst>
+                      <p:childTnLst>
+                        <p:par>
+                          <p:cTn id="8" fill="hold">
+                            <p:stCondLst>
+                              <p:cond delay="0"/>
+                            </p:stCondLst>
+                            <p:childTnLst>
+                              <p:par>
+                                <p:cTn id="9" presetID="1" presetClass="entr" presetSubtype="0" fill="hold" grpId="0" nodeType="clickEffect">
+                                  <p:stCondLst>
+                                    <p:cond delay="0"/>
+                                  </p:stCondLst>
+                                  <p:childTnLst>
+                                    <p:set>
+                                      <p:cBhvr>
+                                        <p:cTn id="10" dur="1" fill="hold">
+                                          <p:stCondLst>
+                                            <p:cond delay="0"/>
+                                          </p:stCondLst>
+                                        </p:cTn>
+                                        <p:tgtEl>
+                                          <p:spTgt spid="3">
+                                            <p:txEl>
+                                              <p:pRg st="1" end="1"/>
+                                            </p:txEl>
+                                          </p:spTgt>
+                                        </p:tgtEl>
+                                        <p:attrNameLst>
+                                          <p:attrName>style.visibility</p:attrName>
+                                        </p:attrNameLst>
+                                      </p:cBhvr>
+                                      <p:to>
+                                        <p:strVal val="visible"/>
+                                      </p:to>
+                                    </p:set>
+                                  </p:childTnLst>
+                                </p:cTn>
+                              </p:par>
+                            </p:childTnLst>
+                          </p:cTn>
+                        </p:par>
+                      </p:childTnLst>
+                    </p:cTn>
+                  </p:par>
+                  <p:par>
+                    <p:cTn id="11" fill="hold">
+                      <p:stCondLst>
+                        <p:cond delay="indefinite"/>
+                      </p:stCondLst>
+                      <p:childTnLst>
+                        <p:par>
+                          <p:cTn id="12" fill="hold">
+                            <p:stCondLst>
+                              <p:cond delay="0"/>
+                            </p:stCondLst>
+                            <p:childTnLst>
+                              <p:par>
+                                <p:cTn id="13" presetID="1" presetClass="entr" presetSubtype="0" fill="hold" grpId="0" nodeType="clickEffect">
+                                  <p:stCondLst>
+                                    <p:cond delay="0"/>
+                                  </p:stCondLst>
+                                  <p:childTnLst>
+                                    <p:set>
+                                      <p:cBhvr>
+                                        <p:cTn id="14" dur="1" fill="hold">
+                                          <p:stCondLst>
+                                            <p:cond delay="0"/>
+                                          </p:stCondLst>
+                                        </p:cTn>
+                                        <p:tgtEl>
+                                          <p:spTgt spid="3">
+                                            <p:txEl>
+                                              <p:pRg st="2" end="2"/>
+                                            </p:txEl>
+                                          </p:spTgt>
+                                        </p:tgtEl>
+                                        <p:attrNameLst>
+                                          <p:attrName>style.visibility</p:attrName>
+                                        </p:attrNameLst>
+                                      </p:cBhvr>
+                                      <p:to>
+                                        <p:strVal val="visible"/>
+                                      </p:to>
+                                    </p:set>
+                                  </p:childTnLst>
+                                </p:cTn>
+                              </p:par>
+                            </p:childTnLst>
+                          </p:cTn>
+                        </p:par>
+                      </p:childTnLst>
+                    </p:cTn>
+                  </p:par>
+                  <p:par>
+                    <p:cTn id="15" fill="hold">
+                      <p:stCondLst>
+                        <p:cond delay="indefinite"/>
+                      </p:stCondLst>
+                      <p:childTnLst>
+                        <p:par>
+                          <p:cTn id="16" fill="hold">
+                            <p:stCondLst>
+                              <p:cond delay="0"/>
+                            </p:stCondLst>
+                            <p:childTnLst>
+                              <p:par>
+                                <p:cTn id="17" presetID="1" presetClass="entr" presetSubtype="0" fill="hold" grpId="0" nodeType="clickEffect">
+                                  <p:stCondLst>
+                                    <p:cond delay="0"/>
+                                  </p:stCondLst>
+                                  <p:childTnLst>
+                                    <p:set>
+                                      <p:cBhvr>
+                                        <p:cTn id="18" dur="1" fill="hold">
+                                          <p:stCondLst>
+                                            <p:cond delay="0"/>
+                                          </p:stCondLst>
+                                        </p:cTn>
+                                        <p:tgtEl>
+                                          <p:spTgt spid="3">
+                                            <p:txEl>
+                                              <p:pRg st="3" end="3"/>
+                                            </p:txEl>
+                                          </p:spTgt>
+                                        </p:tgtEl>
+                                        <p:attrNameLst>
+                                          <p:attrName>style.visibility</p:attrName>
+                                        </p:attrNameLst>
+                                      </p:cBhvr>
+                                      <p:to>
+                                        <p:strVal val="visible"/>
+                                      </p:to>
+                                    </p:set>
+                                  </p:childTnLst>
+                                </p:cTn>
+                              </p:par>
+                            </p:childTnLst>
+                          </p:cTn>
+                        </p:par>
+                      </p:childTnLst>
+                    </p:cTn>
+                  </p:par>
+                  <p:par>
+                    <p:cTn id="19" fill="hold">
+                      <p:stCondLst>
+                        <p:cond delay="indefinite"/>
+                      </p:stCondLst>
+                      <p:childTnLst>
+                        <p:par>
+                          <p:cTn id="20" fill="hold">
+                            <p:stCondLst>
+                              <p:cond delay="0"/>
+                            </p:stCondLst>
+                            <p:childTnLst>
+                              <p:par>
+                                <p:cTn id="21" presetID="1" presetClass="entr" presetSubtype="0" fill="hold" grpId="0" nodeType="clickEffect">
+                                  <p:stCondLst>
+                                    <p:cond delay="0"/>
+                                  </p:stCondLst>
+                                  <p:childTnLst>
+                                    <p:set>
+                                      <p:cBhvr>
+                                        <p:cTn id="22" dur="1" fill="hold">
+                                          <p:stCondLst>
+                                            <p:cond delay="0"/>
+                                          </p:stCondLst>
+                                        </p:cTn>
+                                        <p:tgtEl>
+                                          <p:spTgt spid="3">
+                                            <p:txEl>
+                                              <p:pRg st="4" end="4"/>
+                                            </p:txEl>
+                                          </p:spTgt>
+                                        </p:tgtEl>
+                                        <p:attrNameLst>
+                                          <p:attrName>style.visibility</p:attrName>
+                                        </p:attrNameLst>
+                                      </p:cBhvr>
+                                      <p:to>
+                                        <p:strVal val="visible"/>
+                                      </p:to>
+                                    </p:set>
+                                  </p:childTnLst>
+                                </p:cTn>
+                              </p:par>
+                            </p:childTnLst>
+                          </p:cTn>
+                        </p:par>
+                      </p:childTnLst>
+                    </p:cTn>
+                  </p:par>
+                  <p:par>
+                    <p:cTn id="23" fill="hold">
+                      <p:stCondLst>
+                        <p:cond delay="indefinite"/>
+                      </p:stCondLst>
+                      <p:childTnLst>
+                        <p:par>
+                          <p:cTn id="24" fill="hold">
+                            <p:stCondLst>
+                              <p:cond delay="0"/>
+                            </p:stCondLst>
+                            <p:childTnLst>
+                              <p:par>
+                                <p:cTn id="25" presetID="1" presetClass="entr" presetSubtype="0" fill="hold" grpId="0" nodeType="clickEffect">
+                                  <p:stCondLst>
+                                    <p:cond delay="0"/>
+                                  </p:stCondLst>
+                                  <p:childTnLst>
+                                    <p:set>
+                                      <p:cBhvr>
+                                        <p:cTn id="26" dur="1" fill="hold">
+                                          <p:stCondLst>
+                                            <p:cond delay="0"/>
+                                          </p:stCondLst>
+                                        </p:cTn>
+                                        <p:tgtEl>
+                                          <p:spTgt spid="3">
+                                            <p:txEl>
+                                              <p:pRg st="5" end="5"/>
+                                            </p:txEl>
+                                          </p:spTgt>
+                                        </p:tgtEl>
+                                        <p:attrNameLst>
+                                          <p:attrName>style.visibility</p:attrName>
+                                        </p:attrNameLst>
+                                      </p:cBhvr>
+                                      <p:to>
+                                        <p:strVal val="visible"/>
+                                      </p:to>
+                                    </p:set>
+                                  </p:childTnLst>
+                                </p:cTn>
+                              </p:par>
+                            </p:childTnLst>
+                          </p:cTn>
+                        </p:par>
+                      </p:childTnLst>
+                    </p:cTn>
+                  </p:par>
+                  <p:par>
+                    <p:cTn id="27" fill="hold">
+                      <p:stCondLst>
+                        <p:cond delay="indefinite"/>
+                      </p:stCondLst>
+                      <p:childTnLst>
+                        <p:par>
+                          <p:cTn id="28" fill="hold">
+                            <p:stCondLst>
+                              <p:cond delay="0"/>
+                            </p:stCondLst>
+                            <p:childTnLst>
+                              <p:par>
+                                <p:cTn id="29" presetID="1" presetClass="entr" presetSubtype="0" fill="hold" grpId="0" nodeType="clickEffect">
+                                  <p:stCondLst>
+                                    <p:cond delay="0"/>
+                                  </p:stCondLst>
+                                  <p:childTnLst>
+                                    <p:set>
+                                      <p:cBhvr>
+                                        <p:cTn id="30" dur="1" fill="hold">
+                                          <p:stCondLst>
+                                            <p:cond delay="0"/>
+                                          </p:stCondLst>
+                                        </p:cTn>
+                                        <p:tgtEl>
+                                          <p:spTgt spid="3">
+                                            <p:txEl>
+                                              <p:pRg st="6" end="6"/>
+                                            </p:txEl>
+                                          </p:spTgt>
+                                        </p:tgtEl>
+                                        <p:attrNameLst>
+                                          <p:attrName>style.visibility</p:attrName>
+                                        </p:attrNameLst>
+                                      </p:cBhvr>
+                                      <p:to>
+                                        <p:strVal val="visible"/>
+                                      </p:to>
+                                    </p:set>
+                                  </p:childTnLst>
+                                </p:cTn>
+                              </p:par>
+                            </p:childTnLst>
+                          </p:cTn>
+                        </p:par>
+                      </p:childTnLst>
+                    </p:cTn>
+                  </p:par>
+                  <p:par>
+                    <p:cTn id="31" fill="hold">
+                      <p:stCondLst>
+                        <p:cond delay="indefinite"/>
+                      </p:stCondLst>
+                      <p:childTnLst>
+                        <p:par>
+                          <p:cTn id="32" fill="hold">
+                            <p:stCondLst>
+                              <p:cond delay="0"/>
+                            </p:stCondLst>
+                            <p:childTnLst>
+                              <p:par>
+                                <p:cTn id="33" presetID="1" presetClass="entr" presetSubtype="0" fill="hold" grpId="0" nodeType="clickEffect">
+                                  <p:stCondLst>
+                                    <p:cond delay="0"/>
+                                  </p:stCondLst>
+                                  <p:childTnLst>
+                                    <p:set>
+                                      <p:cBhvr>
+                                        <p:cTn id="34" dur="1" fill="hold">
+                                          <p:stCondLst>
+                                            <p:cond delay="0"/>
+                                          </p:stCondLst>
+                                        </p:cTn>
+                                        <p:tgtEl>
+                                          <p:spTgt spid="3">
+                                            <p:txEl>
+                                              <p:pRg st="7" end="7"/>
+                                            </p:txEl>
+                                          </p:spTgt>
+                                        </p:tgtEl>
+                                        <p:attrNameLst>
+                                          <p:attrName>style.visibility</p:attrName>
+                                        </p:attrNameLst>
+                                      </p:cBhvr>
+                                      <p:to>
+                                        <p:strVal val="visible"/>
+                                      </p:to>
+                                    </p:set>
+                                  </p:childTnLst>
+                                </p:cTn>
+                              </p:par>
+                            </p:childTnLst>
+                          </p:cTn>
+                        </p:par>
+                      </p:childTnLst>
+                    </p:cTn>
+                  </p:par>
+                  <p:par>
+                    <p:cTn id="35" fill="hold">
+                      <p:stCondLst>
+                        <p:cond delay="indefinite"/>
+                      </p:stCondLst>
+                      <p:childTnLst>
+                        <p:par>
+                          <p:cTn id="36" fill="hold">
+                            <p:stCondLst>
+                              <p:cond delay="0"/>
+                            </p:stCondLst>
+                            <p:childTnLst>
+                              <p:par>
+                                <p:cTn id="37" presetID="1" presetClass="entr" presetSubtype="0" fill="hold" grpId="0" nodeType="clickEffect">
+                                  <p:stCondLst>
+                                    <p:cond delay="0"/>
+                                  </p:stCondLst>
+                                  <p:childTnLst>
+                                    <p:set>
+                                      <p:cBhvr>
+                                        <p:cTn id="38" dur="1" fill="hold">
+                                          <p:stCondLst>
+                                            <p:cond delay="0"/>
+                                          </p:stCondLst>
+                                        </p:cTn>
+                                        <p:tgtEl>
+                                          <p:spTgt spid="3">
+                                            <p:txEl>
+                                              <p:pRg st="8" end="8"/>
+                                            </p:txEl>
+                                          </p:spTgt>
+                                        </p:tgtEl>
+                                        <p:attrNameLst>
+                                          <p:attrName>style.visibility</p:attrName>
+                                        </p:attrNameLst>
+                                      </p:cBhvr>
+                                      <p:to>
+                                        <p:strVal val="visible"/>
+                                      </p:to>
+                                    </p:set>
+                                  </p:childTnLst>
+                                </p:cTn>
+                              </p:par>
+                            </p:childTnLst>
+                          </p:cTn>
+                        </p:par>
+                      </p:childTnLst>
+                    </p:cTn>
+                  </p:par>
+                </p:childTnLst>
+              </p:cTn>
+              <p:prevCondLst>
+                <p:cond evt="onPrev" delay="0">
+                  <p:tgtEl>
+                    <p:sldTgt/>
+                  </p:tgtEl>
+                </p:cond>
+              </p:prevCondLst>
+              <p:nextCondLst>
+                <p:cond evt="onNext" delay="0">
+                  <p:tgtEl>
+                    <p:sldTgt/>
+                  </p:tgtEl>
+                </p:cond>
+              </p:nextCondLst>
+            </p:seq>
+          </p:childTnLst>
+        </p:cTn>
+      </p:par>
+    </p:tnLst>
+    <p:bldLst>
+      <p:bldP spid="3" grpId="0" build="p"/>
+    </p:bldLst>
+  </p:timing>
 </p:sld>
 </file>
 
@@ -3496,6 +5305,43 @@
           <a:chExt cx="0" cy="0"/>
         </a:xfrm>
       </p:grpSpPr>
+      <p:pic>
+        <p:nvPicPr>
+          <p:cNvPr id="4" name="Picture 3"/>
+          <p:cNvPicPr>
+            <a:picLocks noChangeAspect="1"/>
+          </p:cNvPicPr>
+          <p:nvPr/>
+        </p:nvPicPr>
+        <p:blipFill>
+          <a:blip r:embed="rId2">
+            <a:duotone>
+              <a:schemeClr val="bg2">
+                <a:shade val="45000"/>
+                <a:satMod val="135000"/>
+              </a:schemeClr>
+              <a:prstClr val="white"/>
+            </a:duotone>
+            <a:extLst>
+              <a:ext uri="{28A0092B-C50C-407E-A947-70E740481C1C}">
+                <a14:useLocalDpi xmlns:a14="http://schemas.microsoft.com/office/drawing/2010/main" val="0"/>
+              </a:ext>
+            </a:extLst>
+          </a:blip>
+          <a:stretch>
+            <a:fillRect/>
+          </a:stretch>
+        </p:blipFill>
+        <p:spPr>
+          <a:xfrm>
+            <a:off x="-1898" y="0"/>
+            <a:ext cx="12192000" cy="6858000"/>
+          </a:xfrm>
+          <a:prstGeom prst="rect">
+            <a:avLst/>
+          </a:prstGeom>
+        </p:spPr>
+      </p:pic>
       <p:sp>
         <p:nvSpPr>
           <p:cNvPr id="2" name="Title 1"/>
@@ -3512,10 +5358,14 @@
           <a:lstStyle/>
           <a:p>
             <a:r>
-              <a:rPr lang="en-GB" dirty="0" smtClean="0"/>
+              <a:rPr lang="en-GB" dirty="0" smtClean="0">
+                <a:latin typeface="Impact" panose="020B0806030902050204" pitchFamily="34" charset="0"/>
+              </a:rPr>
               <a:t>The Choice</a:t>
             </a:r>
-            <a:endParaRPr lang="en-GB" dirty="0"/>
+            <a:endParaRPr lang="en-GB" dirty="0">
+              <a:latin typeface="Impact" panose="020B0806030902050204" pitchFamily="34" charset="0"/>
+            </a:endParaRPr>
           </a:p>
         </p:txBody>
       </p:sp>
@@ -3568,6 +5418,41 @@
           </a:p>
         </p:txBody>
       </p:sp>
+      <p:pic>
+        <p:nvPicPr>
+          <p:cNvPr id="5" name="Picture 4"/>
+          <p:cNvPicPr>
+            <a:picLocks noChangeAspect="1"/>
+          </p:cNvPicPr>
+          <p:nvPr/>
+        </p:nvPicPr>
+        <p:blipFill rotWithShape="1">
+          <a:blip r:embed="rId3" cstate="print">
+            <a:extLst>
+              <a:ext uri="{28A0092B-C50C-407E-A947-70E740481C1C}">
+                <a14:useLocalDpi xmlns:a14="http://schemas.microsoft.com/office/drawing/2010/main" val="0"/>
+              </a:ext>
+            </a:extLst>
+          </a:blip>
+          <a:srcRect l="34290" t="30182" r="32033" b="39515"/>
+          <a:stretch/>
+        </p:blipFill>
+        <p:spPr>
+          <a:xfrm>
+            <a:off x="9711407" y="5126842"/>
+            <a:ext cx="2721379" cy="1731158"/>
+          </a:xfrm>
+          <a:prstGeom prst="rect">
+            <a:avLst/>
+          </a:prstGeom>
+          <a:scene3d>
+            <a:camera prst="orthographicFront">
+              <a:rot lat="0" lon="10799978" rev="0"/>
+            </a:camera>
+            <a:lightRig rig="threePt" dir="t"/>
+          </a:scene3d>
+        </p:spPr>
+      </p:pic>
     </p:spTree>
     <p:extLst>
       <p:ext uri="{BB962C8B-B14F-4D97-AF65-F5344CB8AC3E}">
@@ -3578,6 +5463,284 @@
   <p:clrMapOvr>
     <a:masterClrMapping/>
   </p:clrMapOvr>
+  <p:timing>
+    <p:tnLst>
+      <p:par>
+        <p:cTn id="1" dur="indefinite" restart="never" nodeType="tmRoot">
+          <p:childTnLst>
+            <p:seq concurrent="1" nextAc="seek">
+              <p:cTn id="2" dur="indefinite" nodeType="mainSeq">
+                <p:childTnLst>
+                  <p:par>
+                    <p:cTn id="3" fill="hold">
+                      <p:stCondLst>
+                        <p:cond delay="indefinite"/>
+                      </p:stCondLst>
+                      <p:childTnLst>
+                        <p:par>
+                          <p:cTn id="4" fill="hold">
+                            <p:stCondLst>
+                              <p:cond delay="0"/>
+                            </p:stCondLst>
+                            <p:childTnLst>
+                              <p:par>
+                                <p:cTn id="5" presetID="1" presetClass="entr" presetSubtype="0" fill="hold" grpId="0" nodeType="clickEffect">
+                                  <p:stCondLst>
+                                    <p:cond delay="0"/>
+                                  </p:stCondLst>
+                                  <p:childTnLst>
+                                    <p:set>
+                                      <p:cBhvr>
+                                        <p:cTn id="6" dur="1" fill="hold">
+                                          <p:stCondLst>
+                                            <p:cond delay="0"/>
+                                          </p:stCondLst>
+                                        </p:cTn>
+                                        <p:tgtEl>
+                                          <p:spTgt spid="3">
+                                            <p:txEl>
+                                              <p:pRg st="0" end="0"/>
+                                            </p:txEl>
+                                          </p:spTgt>
+                                        </p:tgtEl>
+                                        <p:attrNameLst>
+                                          <p:attrName>style.visibility</p:attrName>
+                                        </p:attrNameLst>
+                                      </p:cBhvr>
+                                      <p:to>
+                                        <p:strVal val="visible"/>
+                                      </p:to>
+                                    </p:set>
+                                  </p:childTnLst>
+                                </p:cTn>
+                              </p:par>
+                            </p:childTnLst>
+                          </p:cTn>
+                        </p:par>
+                      </p:childTnLst>
+                    </p:cTn>
+                  </p:par>
+                  <p:par>
+                    <p:cTn id="7" fill="hold">
+                      <p:stCondLst>
+                        <p:cond delay="indefinite"/>
+                      </p:stCondLst>
+                      <p:childTnLst>
+                        <p:par>
+                          <p:cTn id="8" fill="hold">
+                            <p:stCondLst>
+                              <p:cond delay="0"/>
+                            </p:stCondLst>
+                            <p:childTnLst>
+                              <p:par>
+                                <p:cTn id="9" presetID="1" presetClass="entr" presetSubtype="0" fill="hold" grpId="0" nodeType="clickEffect">
+                                  <p:stCondLst>
+                                    <p:cond delay="0"/>
+                                  </p:stCondLst>
+                                  <p:childTnLst>
+                                    <p:set>
+                                      <p:cBhvr>
+                                        <p:cTn id="10" dur="1" fill="hold">
+                                          <p:stCondLst>
+                                            <p:cond delay="0"/>
+                                          </p:stCondLst>
+                                        </p:cTn>
+                                        <p:tgtEl>
+                                          <p:spTgt spid="3">
+                                            <p:txEl>
+                                              <p:pRg st="1" end="1"/>
+                                            </p:txEl>
+                                          </p:spTgt>
+                                        </p:tgtEl>
+                                        <p:attrNameLst>
+                                          <p:attrName>style.visibility</p:attrName>
+                                        </p:attrNameLst>
+                                      </p:cBhvr>
+                                      <p:to>
+                                        <p:strVal val="visible"/>
+                                      </p:to>
+                                    </p:set>
+                                  </p:childTnLst>
+                                </p:cTn>
+                              </p:par>
+                            </p:childTnLst>
+                          </p:cTn>
+                        </p:par>
+                      </p:childTnLst>
+                    </p:cTn>
+                  </p:par>
+                  <p:par>
+                    <p:cTn id="11" fill="hold">
+                      <p:stCondLst>
+                        <p:cond delay="indefinite"/>
+                      </p:stCondLst>
+                      <p:childTnLst>
+                        <p:par>
+                          <p:cTn id="12" fill="hold">
+                            <p:stCondLst>
+                              <p:cond delay="0"/>
+                            </p:stCondLst>
+                            <p:childTnLst>
+                              <p:par>
+                                <p:cTn id="13" presetID="1" presetClass="entr" presetSubtype="0" fill="hold" grpId="0" nodeType="clickEffect">
+                                  <p:stCondLst>
+                                    <p:cond delay="0"/>
+                                  </p:stCondLst>
+                                  <p:childTnLst>
+                                    <p:set>
+                                      <p:cBhvr>
+                                        <p:cTn id="14" dur="1" fill="hold">
+                                          <p:stCondLst>
+                                            <p:cond delay="0"/>
+                                          </p:stCondLst>
+                                        </p:cTn>
+                                        <p:tgtEl>
+                                          <p:spTgt spid="3">
+                                            <p:txEl>
+                                              <p:pRg st="2" end="2"/>
+                                            </p:txEl>
+                                          </p:spTgt>
+                                        </p:tgtEl>
+                                        <p:attrNameLst>
+                                          <p:attrName>style.visibility</p:attrName>
+                                        </p:attrNameLst>
+                                      </p:cBhvr>
+                                      <p:to>
+                                        <p:strVal val="visible"/>
+                                      </p:to>
+                                    </p:set>
+                                  </p:childTnLst>
+                                </p:cTn>
+                              </p:par>
+                            </p:childTnLst>
+                          </p:cTn>
+                        </p:par>
+                      </p:childTnLst>
+                    </p:cTn>
+                  </p:par>
+                  <p:par>
+                    <p:cTn id="15" fill="hold">
+                      <p:stCondLst>
+                        <p:cond delay="indefinite"/>
+                      </p:stCondLst>
+                      <p:childTnLst>
+                        <p:par>
+                          <p:cTn id="16" fill="hold">
+                            <p:stCondLst>
+                              <p:cond delay="0"/>
+                            </p:stCondLst>
+                            <p:childTnLst>
+                              <p:par>
+                                <p:cTn id="17" presetID="1" presetClass="entr" presetSubtype="0" fill="hold" grpId="0" nodeType="clickEffect">
+                                  <p:stCondLst>
+                                    <p:cond delay="0"/>
+                                  </p:stCondLst>
+                                  <p:childTnLst>
+                                    <p:set>
+                                      <p:cBhvr>
+                                        <p:cTn id="18" dur="1" fill="hold">
+                                          <p:stCondLst>
+                                            <p:cond delay="0"/>
+                                          </p:stCondLst>
+                                        </p:cTn>
+                                        <p:tgtEl>
+                                          <p:spTgt spid="3">
+                                            <p:txEl>
+                                              <p:pRg st="3" end="3"/>
+                                            </p:txEl>
+                                          </p:spTgt>
+                                        </p:tgtEl>
+                                        <p:attrNameLst>
+                                          <p:attrName>style.visibility</p:attrName>
+                                        </p:attrNameLst>
+                                      </p:cBhvr>
+                                      <p:to>
+                                        <p:strVal val="visible"/>
+                                      </p:to>
+                                    </p:set>
+                                  </p:childTnLst>
+                                </p:cTn>
+                              </p:par>
+                            </p:childTnLst>
+                          </p:cTn>
+                        </p:par>
+                      </p:childTnLst>
+                    </p:cTn>
+                  </p:par>
+                  <p:par>
+                    <p:cTn id="19" fill="hold">
+                      <p:stCondLst>
+                        <p:cond delay="indefinite"/>
+                      </p:stCondLst>
+                      <p:childTnLst>
+                        <p:par>
+                          <p:cTn id="20" fill="hold">
+                            <p:stCondLst>
+                              <p:cond delay="0"/>
+                            </p:stCondLst>
+                            <p:childTnLst>
+                              <p:par>
+                                <p:cTn id="21" presetID="1" presetClass="entr" presetSubtype="0" fill="hold" grpId="0" nodeType="clickEffect">
+                                  <p:stCondLst>
+                                    <p:cond delay="0"/>
+                                  </p:stCondLst>
+                                  <p:childTnLst>
+                                    <p:set>
+                                      <p:cBhvr>
+                                        <p:cTn id="22" dur="1" fill="hold">
+                                          <p:stCondLst>
+                                            <p:cond delay="0"/>
+                                          </p:stCondLst>
+                                        </p:cTn>
+                                        <p:tgtEl>
+                                          <p:spTgt spid="3">
+                                            <p:txEl>
+                                              <p:pRg st="4" end="4"/>
+                                            </p:txEl>
+                                          </p:spTgt>
+                                        </p:tgtEl>
+                                        <p:attrNameLst>
+                                          <p:attrName>style.visibility</p:attrName>
+                                        </p:attrNameLst>
+                                      </p:cBhvr>
+                                      <p:to>
+                                        <p:strVal val="visible"/>
+                                      </p:to>
+                                    </p:set>
+                                  </p:childTnLst>
+                                </p:cTn>
+                              </p:par>
+                            </p:childTnLst>
+                          </p:cTn>
+                        </p:par>
+                      </p:childTnLst>
+                    </p:cTn>
+                  </p:par>
+                </p:childTnLst>
+              </p:cTn>
+              <p:prevCondLst>
+                <p:cond evt="onPrev" delay="0">
+                  <p:tgtEl>
+                    <p:sldTgt/>
+                  </p:tgtEl>
+                </p:cond>
+              </p:prevCondLst>
+              <p:nextCondLst>
+                <p:cond evt="onNext" delay="0">
+                  <p:tgtEl>
+                    <p:sldTgt/>
+                  </p:tgtEl>
+                </p:cond>
+              </p:nextCondLst>
+            </p:seq>
+          </p:childTnLst>
+        </p:cTn>
+      </p:par>
+    </p:tnLst>
+    <p:bldLst>
+      <p:bldP spid="3" grpId="0" build="p"/>
+    </p:bldLst>
+  </p:timing>
 </p:sld>
 </file>
 

</xml_diff>

<commit_message>
created all my notes for what i would like to say
</commit_message>
<xml_diff>
--- a/Business Presentation.pptx
+++ b/Business Presentation.pptx
@@ -4,6 +4,9 @@
   <p:sldMasterIdLst>
     <p:sldMasterId id="2147483648" r:id="rId1"/>
   </p:sldMasterIdLst>
+  <p:notesMasterIdLst>
+    <p:notesMasterId r:id="rId8"/>
+  </p:notesMasterIdLst>
   <p:sldIdLst>
     <p:sldId id="256" r:id="rId2"/>
     <p:sldId id="257" r:id="rId3"/>
@@ -115,6 +118,1079 @@
     </p:ext>
   </p:extLst>
 </p:presentation>
+</file>
+
+<file path=ppt/notesMasters/notesMaster1.xml><?xml version="1.0" encoding="utf-8"?>
+<p:notesMaster xmlns:a="http://schemas.openxmlformats.org/drawingml/2006/main" xmlns:r="http://schemas.openxmlformats.org/officeDocument/2006/relationships" xmlns:p="http://schemas.openxmlformats.org/presentationml/2006/main">
+  <p:cSld>
+    <p:bg>
+      <p:bgRef idx="1001">
+        <a:schemeClr val="bg1"/>
+      </p:bgRef>
+    </p:bg>
+    <p:spTree>
+      <p:nvGrpSpPr>
+        <p:cNvPr id="1" name=""/>
+        <p:cNvGrpSpPr/>
+        <p:nvPr/>
+      </p:nvGrpSpPr>
+      <p:grpSpPr>
+        <a:xfrm>
+          <a:off x="0" y="0"/>
+          <a:ext cx="0" cy="0"/>
+          <a:chOff x="0" y="0"/>
+          <a:chExt cx="0" cy="0"/>
+        </a:xfrm>
+      </p:grpSpPr>
+      <p:sp>
+        <p:nvSpPr>
+          <p:cNvPr id="2" name="Header Placeholder 1"/>
+          <p:cNvSpPr>
+            <a:spLocks noGrp="1"/>
+          </p:cNvSpPr>
+          <p:nvPr>
+            <p:ph type="hdr" sz="quarter"/>
+          </p:nvPr>
+        </p:nvSpPr>
+        <p:spPr>
+          <a:xfrm>
+            <a:off x="0" y="0"/>
+            <a:ext cx="2971800" cy="458788"/>
+          </a:xfrm>
+          <a:prstGeom prst="rect">
+            <a:avLst/>
+          </a:prstGeom>
+        </p:spPr>
+        <p:txBody>
+          <a:bodyPr vert="horz" lIns="91440" tIns="45720" rIns="91440" bIns="45720" rtlCol="0"/>
+          <a:lstStyle>
+            <a:lvl1pPr algn="l">
+              <a:defRPr sz="1200"/>
+            </a:lvl1pPr>
+          </a:lstStyle>
+          <a:p>
+            <a:endParaRPr lang="en-GB"/>
+          </a:p>
+        </p:txBody>
+      </p:sp>
+      <p:sp>
+        <p:nvSpPr>
+          <p:cNvPr id="3" name="Date Placeholder 2"/>
+          <p:cNvSpPr>
+            <a:spLocks noGrp="1"/>
+          </p:cNvSpPr>
+          <p:nvPr>
+            <p:ph type="dt" idx="1"/>
+          </p:nvPr>
+        </p:nvSpPr>
+        <p:spPr>
+          <a:xfrm>
+            <a:off x="3884613" y="0"/>
+            <a:ext cx="2971800" cy="458788"/>
+          </a:xfrm>
+          <a:prstGeom prst="rect">
+            <a:avLst/>
+          </a:prstGeom>
+        </p:spPr>
+        <p:txBody>
+          <a:bodyPr vert="horz" lIns="91440" tIns="45720" rIns="91440" bIns="45720" rtlCol="0"/>
+          <a:lstStyle>
+            <a:lvl1pPr algn="r">
+              <a:defRPr sz="1200"/>
+            </a:lvl1pPr>
+          </a:lstStyle>
+          <a:p>
+            <a:fld id="{A73A2962-9660-41C5-9054-E2F363C37083}" type="datetimeFigureOut">
+              <a:rPr lang="en-GB" smtClean="0"/>
+              <a:t>08/03/2019</a:t>
+            </a:fld>
+            <a:endParaRPr lang="en-GB"/>
+          </a:p>
+        </p:txBody>
+      </p:sp>
+      <p:sp>
+        <p:nvSpPr>
+          <p:cNvPr id="4" name="Slide Image Placeholder 3"/>
+          <p:cNvSpPr>
+            <a:spLocks noGrp="1" noRot="1" noChangeAspect="1"/>
+          </p:cNvSpPr>
+          <p:nvPr>
+            <p:ph type="sldImg" idx="2"/>
+          </p:nvPr>
+        </p:nvSpPr>
+        <p:spPr>
+          <a:xfrm>
+            <a:off x="685800" y="1143000"/>
+            <a:ext cx="5486400" cy="3086100"/>
+          </a:xfrm>
+          <a:prstGeom prst="rect">
+            <a:avLst/>
+          </a:prstGeom>
+          <a:noFill/>
+          <a:ln w="12700">
+            <a:solidFill>
+              <a:prstClr val="black"/>
+            </a:solidFill>
+          </a:ln>
+        </p:spPr>
+        <p:txBody>
+          <a:bodyPr vert="horz" lIns="91440" tIns="45720" rIns="91440" bIns="45720" rtlCol="0" anchor="ctr"/>
+          <a:lstStyle/>
+          <a:p>
+            <a:endParaRPr lang="en-GB"/>
+          </a:p>
+        </p:txBody>
+      </p:sp>
+      <p:sp>
+        <p:nvSpPr>
+          <p:cNvPr id="5" name="Notes Placeholder 4"/>
+          <p:cNvSpPr>
+            <a:spLocks noGrp="1"/>
+          </p:cNvSpPr>
+          <p:nvPr>
+            <p:ph type="body" sz="quarter" idx="3"/>
+          </p:nvPr>
+        </p:nvSpPr>
+        <p:spPr>
+          <a:xfrm>
+            <a:off x="685800" y="4400550"/>
+            <a:ext cx="5486400" cy="3600450"/>
+          </a:xfrm>
+          <a:prstGeom prst="rect">
+            <a:avLst/>
+          </a:prstGeom>
+        </p:spPr>
+        <p:txBody>
+          <a:bodyPr vert="horz" lIns="91440" tIns="45720" rIns="91440" bIns="45720" rtlCol="0"/>
+          <a:lstStyle/>
+          <a:p>
+            <a:pPr lvl="0"/>
+            <a:r>
+              <a:rPr lang="en-US" smtClean="0"/>
+              <a:t>Edit Master text styles</a:t>
+            </a:r>
+          </a:p>
+          <a:p>
+            <a:pPr lvl="1"/>
+            <a:r>
+              <a:rPr lang="en-US" smtClean="0"/>
+              <a:t>Second level</a:t>
+            </a:r>
+          </a:p>
+          <a:p>
+            <a:pPr lvl="2"/>
+            <a:r>
+              <a:rPr lang="en-US" smtClean="0"/>
+              <a:t>Third level</a:t>
+            </a:r>
+          </a:p>
+          <a:p>
+            <a:pPr lvl="3"/>
+            <a:r>
+              <a:rPr lang="en-US" smtClean="0"/>
+              <a:t>Fourth level</a:t>
+            </a:r>
+          </a:p>
+          <a:p>
+            <a:pPr lvl="4"/>
+            <a:r>
+              <a:rPr lang="en-US" smtClean="0"/>
+              <a:t>Fifth level</a:t>
+            </a:r>
+            <a:endParaRPr lang="en-GB"/>
+          </a:p>
+        </p:txBody>
+      </p:sp>
+      <p:sp>
+        <p:nvSpPr>
+          <p:cNvPr id="6" name="Footer Placeholder 5"/>
+          <p:cNvSpPr>
+            <a:spLocks noGrp="1"/>
+          </p:cNvSpPr>
+          <p:nvPr>
+            <p:ph type="ftr" sz="quarter" idx="4"/>
+          </p:nvPr>
+        </p:nvSpPr>
+        <p:spPr>
+          <a:xfrm>
+            <a:off x="0" y="8685213"/>
+            <a:ext cx="2971800" cy="458787"/>
+          </a:xfrm>
+          <a:prstGeom prst="rect">
+            <a:avLst/>
+          </a:prstGeom>
+        </p:spPr>
+        <p:txBody>
+          <a:bodyPr vert="horz" lIns="91440" tIns="45720" rIns="91440" bIns="45720" rtlCol="0" anchor="b"/>
+          <a:lstStyle>
+            <a:lvl1pPr algn="l">
+              <a:defRPr sz="1200"/>
+            </a:lvl1pPr>
+          </a:lstStyle>
+          <a:p>
+            <a:endParaRPr lang="en-GB"/>
+          </a:p>
+        </p:txBody>
+      </p:sp>
+      <p:sp>
+        <p:nvSpPr>
+          <p:cNvPr id="7" name="Slide Number Placeholder 6"/>
+          <p:cNvSpPr>
+            <a:spLocks noGrp="1"/>
+          </p:cNvSpPr>
+          <p:nvPr>
+            <p:ph type="sldNum" sz="quarter" idx="5"/>
+          </p:nvPr>
+        </p:nvSpPr>
+        <p:spPr>
+          <a:xfrm>
+            <a:off x="3884613" y="8685213"/>
+            <a:ext cx="2971800" cy="458787"/>
+          </a:xfrm>
+          <a:prstGeom prst="rect">
+            <a:avLst/>
+          </a:prstGeom>
+        </p:spPr>
+        <p:txBody>
+          <a:bodyPr vert="horz" lIns="91440" tIns="45720" rIns="91440" bIns="45720" rtlCol="0" anchor="b"/>
+          <a:lstStyle>
+            <a:lvl1pPr algn="r">
+              <a:defRPr sz="1200"/>
+            </a:lvl1pPr>
+          </a:lstStyle>
+          <a:p>
+            <a:fld id="{64232E02-0700-4753-8DBD-B1B244F2AE57}" type="slidenum">
+              <a:rPr lang="en-GB" smtClean="0"/>
+              <a:t>‹#›</a:t>
+            </a:fld>
+            <a:endParaRPr lang="en-GB"/>
+          </a:p>
+        </p:txBody>
+      </p:sp>
+    </p:spTree>
+    <p:extLst>
+      <p:ext uri="{BB962C8B-B14F-4D97-AF65-F5344CB8AC3E}">
+        <p14:creationId xmlns:p14="http://schemas.microsoft.com/office/powerpoint/2010/main" val="2966477521"/>
+      </p:ext>
+    </p:extLst>
+  </p:cSld>
+  <p:clrMap bg1="lt1" tx1="dk1" bg2="lt2" tx2="dk2" accent1="accent1" accent2="accent2" accent3="accent3" accent4="accent4" accent5="accent5" accent6="accent6" hlink="hlink" folHlink="folHlink"/>
+  <p:notesStyle>
+    <a:lvl1pPr marL="0" algn="l" defTabSz="914400" rtl="0" eaLnBrk="1" latinLnBrk="0" hangingPunct="1">
+      <a:defRPr sz="1200" kern="1200">
+        <a:solidFill>
+          <a:schemeClr val="tx1"/>
+        </a:solidFill>
+        <a:latin typeface="+mn-lt"/>
+        <a:ea typeface="+mn-ea"/>
+        <a:cs typeface="+mn-cs"/>
+      </a:defRPr>
+    </a:lvl1pPr>
+    <a:lvl2pPr marL="457200" algn="l" defTabSz="914400" rtl="0" eaLnBrk="1" latinLnBrk="0" hangingPunct="1">
+      <a:defRPr sz="1200" kern="1200">
+        <a:solidFill>
+          <a:schemeClr val="tx1"/>
+        </a:solidFill>
+        <a:latin typeface="+mn-lt"/>
+        <a:ea typeface="+mn-ea"/>
+        <a:cs typeface="+mn-cs"/>
+      </a:defRPr>
+    </a:lvl2pPr>
+    <a:lvl3pPr marL="914400" algn="l" defTabSz="914400" rtl="0" eaLnBrk="1" latinLnBrk="0" hangingPunct="1">
+      <a:defRPr sz="1200" kern="1200">
+        <a:solidFill>
+          <a:schemeClr val="tx1"/>
+        </a:solidFill>
+        <a:latin typeface="+mn-lt"/>
+        <a:ea typeface="+mn-ea"/>
+        <a:cs typeface="+mn-cs"/>
+      </a:defRPr>
+    </a:lvl3pPr>
+    <a:lvl4pPr marL="1371600" algn="l" defTabSz="914400" rtl="0" eaLnBrk="1" latinLnBrk="0" hangingPunct="1">
+      <a:defRPr sz="1200" kern="1200">
+        <a:solidFill>
+          <a:schemeClr val="tx1"/>
+        </a:solidFill>
+        <a:latin typeface="+mn-lt"/>
+        <a:ea typeface="+mn-ea"/>
+        <a:cs typeface="+mn-cs"/>
+      </a:defRPr>
+    </a:lvl4pPr>
+    <a:lvl5pPr marL="1828800" algn="l" defTabSz="914400" rtl="0" eaLnBrk="1" latinLnBrk="0" hangingPunct="1">
+      <a:defRPr sz="1200" kern="1200">
+        <a:solidFill>
+          <a:schemeClr val="tx1"/>
+        </a:solidFill>
+        <a:latin typeface="+mn-lt"/>
+        <a:ea typeface="+mn-ea"/>
+        <a:cs typeface="+mn-cs"/>
+      </a:defRPr>
+    </a:lvl5pPr>
+    <a:lvl6pPr marL="2286000" algn="l" defTabSz="914400" rtl="0" eaLnBrk="1" latinLnBrk="0" hangingPunct="1">
+      <a:defRPr sz="1200" kern="1200">
+        <a:solidFill>
+          <a:schemeClr val="tx1"/>
+        </a:solidFill>
+        <a:latin typeface="+mn-lt"/>
+        <a:ea typeface="+mn-ea"/>
+        <a:cs typeface="+mn-cs"/>
+      </a:defRPr>
+    </a:lvl6pPr>
+    <a:lvl7pPr marL="2743200" algn="l" defTabSz="914400" rtl="0" eaLnBrk="1" latinLnBrk="0" hangingPunct="1">
+      <a:defRPr sz="1200" kern="1200">
+        <a:solidFill>
+          <a:schemeClr val="tx1"/>
+        </a:solidFill>
+        <a:latin typeface="+mn-lt"/>
+        <a:ea typeface="+mn-ea"/>
+        <a:cs typeface="+mn-cs"/>
+      </a:defRPr>
+    </a:lvl7pPr>
+    <a:lvl8pPr marL="3200400" algn="l" defTabSz="914400" rtl="0" eaLnBrk="1" latinLnBrk="0" hangingPunct="1">
+      <a:defRPr sz="1200" kern="1200">
+        <a:solidFill>
+          <a:schemeClr val="tx1"/>
+        </a:solidFill>
+        <a:latin typeface="+mn-lt"/>
+        <a:ea typeface="+mn-ea"/>
+        <a:cs typeface="+mn-cs"/>
+      </a:defRPr>
+    </a:lvl8pPr>
+    <a:lvl9pPr marL="3657600" algn="l" defTabSz="914400" rtl="0" eaLnBrk="1" latinLnBrk="0" hangingPunct="1">
+      <a:defRPr sz="1200" kern="1200">
+        <a:solidFill>
+          <a:schemeClr val="tx1"/>
+        </a:solidFill>
+        <a:latin typeface="+mn-lt"/>
+        <a:ea typeface="+mn-ea"/>
+        <a:cs typeface="+mn-cs"/>
+      </a:defRPr>
+    </a:lvl9pPr>
+  </p:notesStyle>
+</p:notesMaster>
+</file>
+
+<file path=ppt/notesSlides/notesSlide1.xml><?xml version="1.0" encoding="utf-8"?>
+<p:notes xmlns:a="http://schemas.openxmlformats.org/drawingml/2006/main" xmlns:r="http://schemas.openxmlformats.org/officeDocument/2006/relationships" xmlns:p="http://schemas.openxmlformats.org/presentationml/2006/main">
+  <p:cSld>
+    <p:spTree>
+      <p:nvGrpSpPr>
+        <p:cNvPr id="1" name=""/>
+        <p:cNvGrpSpPr/>
+        <p:nvPr/>
+      </p:nvGrpSpPr>
+      <p:grpSpPr>
+        <a:xfrm>
+          <a:off x="0" y="0"/>
+          <a:ext cx="0" cy="0"/>
+          <a:chOff x="0" y="0"/>
+          <a:chExt cx="0" cy="0"/>
+        </a:xfrm>
+      </p:grpSpPr>
+      <p:sp>
+        <p:nvSpPr>
+          <p:cNvPr id="2" name="Slide Image Placeholder 1"/>
+          <p:cNvSpPr>
+            <a:spLocks noGrp="1" noRot="1" noChangeAspect="1"/>
+          </p:cNvSpPr>
+          <p:nvPr>
+            <p:ph type="sldImg"/>
+          </p:nvPr>
+        </p:nvSpPr>
+        <p:spPr/>
+      </p:sp>
+      <p:sp>
+        <p:nvSpPr>
+          <p:cNvPr id="3" name="Notes Placeholder 2"/>
+          <p:cNvSpPr>
+            <a:spLocks noGrp="1"/>
+          </p:cNvSpPr>
+          <p:nvPr>
+            <p:ph type="body" idx="1"/>
+          </p:nvPr>
+        </p:nvSpPr>
+        <p:spPr/>
+        <p:txBody>
+          <a:bodyPr/>
+          <a:lstStyle/>
+          <a:p>
+            <a:r>
+              <a:rPr lang="en-GB" dirty="0" smtClean="0"/>
+              <a:t>We’ve been lucky enough to have a publisher approach</a:t>
+            </a:r>
+            <a:r>
+              <a:rPr lang="en-GB" baseline="0" dirty="0" smtClean="0"/>
+              <a:t> us and offer a business deal, because of that I’ve had a look into the how our future may look if we take or leave the deal.</a:t>
+            </a:r>
+            <a:endParaRPr lang="en-GB" dirty="0"/>
+          </a:p>
+        </p:txBody>
+      </p:sp>
+      <p:sp>
+        <p:nvSpPr>
+          <p:cNvPr id="4" name="Slide Number Placeholder 3"/>
+          <p:cNvSpPr>
+            <a:spLocks noGrp="1"/>
+          </p:cNvSpPr>
+          <p:nvPr>
+            <p:ph type="sldNum" sz="quarter" idx="10"/>
+          </p:nvPr>
+        </p:nvSpPr>
+        <p:spPr/>
+        <p:txBody>
+          <a:bodyPr/>
+          <a:lstStyle/>
+          <a:p>
+            <a:fld id="{64232E02-0700-4753-8DBD-B1B244F2AE57}" type="slidenum">
+              <a:rPr lang="en-GB" smtClean="0"/>
+              <a:t>1</a:t>
+            </a:fld>
+            <a:endParaRPr lang="en-GB"/>
+          </a:p>
+        </p:txBody>
+      </p:sp>
+    </p:spTree>
+    <p:extLst>
+      <p:ext uri="{BB962C8B-B14F-4D97-AF65-F5344CB8AC3E}">
+        <p14:creationId xmlns:p14="http://schemas.microsoft.com/office/powerpoint/2010/main" val="1839142124"/>
+      </p:ext>
+    </p:extLst>
+  </p:cSld>
+  <p:clrMapOvr>
+    <a:masterClrMapping/>
+  </p:clrMapOvr>
+</p:notes>
+</file>
+
+<file path=ppt/notesSlides/notesSlide2.xml><?xml version="1.0" encoding="utf-8"?>
+<p:notes xmlns:a="http://schemas.openxmlformats.org/drawingml/2006/main" xmlns:r="http://schemas.openxmlformats.org/officeDocument/2006/relationships" xmlns:p="http://schemas.openxmlformats.org/presentationml/2006/main">
+  <p:cSld>
+    <p:spTree>
+      <p:nvGrpSpPr>
+        <p:cNvPr id="1" name=""/>
+        <p:cNvGrpSpPr/>
+        <p:nvPr/>
+      </p:nvGrpSpPr>
+      <p:grpSpPr>
+        <a:xfrm>
+          <a:off x="0" y="0"/>
+          <a:ext cx="0" cy="0"/>
+          <a:chOff x="0" y="0"/>
+          <a:chExt cx="0" cy="0"/>
+        </a:xfrm>
+      </p:grpSpPr>
+      <p:sp>
+        <p:nvSpPr>
+          <p:cNvPr id="2" name="Slide Image Placeholder 1"/>
+          <p:cNvSpPr>
+            <a:spLocks noGrp="1" noRot="1" noChangeAspect="1"/>
+          </p:cNvSpPr>
+          <p:nvPr>
+            <p:ph type="sldImg"/>
+          </p:nvPr>
+        </p:nvSpPr>
+        <p:spPr/>
+      </p:sp>
+      <p:sp>
+        <p:nvSpPr>
+          <p:cNvPr id="3" name="Notes Placeholder 2"/>
+          <p:cNvSpPr>
+            <a:spLocks noGrp="1"/>
+          </p:cNvSpPr>
+          <p:nvPr>
+            <p:ph type="body" idx="1"/>
+          </p:nvPr>
+        </p:nvSpPr>
+        <p:spPr/>
+        <p:txBody>
+          <a:bodyPr/>
+          <a:lstStyle/>
+          <a:p>
+            <a:r>
+              <a:rPr lang="en-GB" dirty="0" smtClean="0"/>
+              <a:t>If we continue down the route of self publishing</a:t>
+            </a:r>
+            <a:r>
+              <a:rPr lang="en-GB" baseline="0" dirty="0" smtClean="0"/>
+              <a:t> we will expect to: </a:t>
+            </a:r>
+          </a:p>
+          <a:p>
+            <a:r>
+              <a:rPr lang="en-GB" baseline="0" dirty="0" smtClean="0"/>
+              <a:t>keep on working remotely to save money</a:t>
+            </a:r>
+          </a:p>
+          <a:p>
+            <a:r>
+              <a:rPr lang="en-GB" baseline="0" dirty="0" smtClean="0"/>
+              <a:t>It will take us another 6 months to finish the development as already planned</a:t>
+            </a:r>
+          </a:p>
+          <a:p>
+            <a:r>
+              <a:rPr lang="en-GB" baseline="0" dirty="0" smtClean="0"/>
+              <a:t>Expect to reach approximately 10k sales via itch.io only, selling at a minimum net profit per sale for £5</a:t>
+            </a:r>
+          </a:p>
+          <a:p>
+            <a:r>
+              <a:rPr lang="en-GB" baseline="0" dirty="0" smtClean="0"/>
+              <a:t>This is the minimum we would be willing to take, so there is scope to sell for a higher price if viable.</a:t>
+            </a:r>
+            <a:endParaRPr lang="en-GB" dirty="0"/>
+          </a:p>
+        </p:txBody>
+      </p:sp>
+      <p:sp>
+        <p:nvSpPr>
+          <p:cNvPr id="4" name="Slide Number Placeholder 3"/>
+          <p:cNvSpPr>
+            <a:spLocks noGrp="1"/>
+          </p:cNvSpPr>
+          <p:nvPr>
+            <p:ph type="sldNum" sz="quarter" idx="10"/>
+          </p:nvPr>
+        </p:nvSpPr>
+        <p:spPr/>
+        <p:txBody>
+          <a:bodyPr/>
+          <a:lstStyle/>
+          <a:p>
+            <a:fld id="{64232E02-0700-4753-8DBD-B1B244F2AE57}" type="slidenum">
+              <a:rPr lang="en-GB" smtClean="0"/>
+              <a:t>2</a:t>
+            </a:fld>
+            <a:endParaRPr lang="en-GB"/>
+          </a:p>
+        </p:txBody>
+      </p:sp>
+    </p:spTree>
+    <p:extLst>
+      <p:ext uri="{BB962C8B-B14F-4D97-AF65-F5344CB8AC3E}">
+        <p14:creationId xmlns:p14="http://schemas.microsoft.com/office/powerpoint/2010/main" val="1180053028"/>
+      </p:ext>
+    </p:extLst>
+  </p:cSld>
+  <p:clrMapOvr>
+    <a:masterClrMapping/>
+  </p:clrMapOvr>
+</p:notes>
+</file>
+
+<file path=ppt/notesSlides/notesSlide3.xml><?xml version="1.0" encoding="utf-8"?>
+<p:notes xmlns:a="http://schemas.openxmlformats.org/drawingml/2006/main" xmlns:r="http://schemas.openxmlformats.org/officeDocument/2006/relationships" xmlns:p="http://schemas.openxmlformats.org/presentationml/2006/main">
+  <p:cSld>
+    <p:spTree>
+      <p:nvGrpSpPr>
+        <p:cNvPr id="1" name=""/>
+        <p:cNvGrpSpPr/>
+        <p:nvPr/>
+      </p:nvGrpSpPr>
+      <p:grpSpPr>
+        <a:xfrm>
+          <a:off x="0" y="0"/>
+          <a:ext cx="0" cy="0"/>
+          <a:chOff x="0" y="0"/>
+          <a:chExt cx="0" cy="0"/>
+        </a:xfrm>
+      </p:grpSpPr>
+      <p:sp>
+        <p:nvSpPr>
+          <p:cNvPr id="2" name="Slide Image Placeholder 1"/>
+          <p:cNvSpPr>
+            <a:spLocks noGrp="1" noRot="1" noChangeAspect="1"/>
+          </p:cNvSpPr>
+          <p:nvPr>
+            <p:ph type="sldImg"/>
+          </p:nvPr>
+        </p:nvSpPr>
+        <p:spPr/>
+      </p:sp>
+      <p:sp>
+        <p:nvSpPr>
+          <p:cNvPr id="3" name="Notes Placeholder 2"/>
+          <p:cNvSpPr>
+            <a:spLocks noGrp="1"/>
+          </p:cNvSpPr>
+          <p:nvPr>
+            <p:ph type="body" idx="1"/>
+          </p:nvPr>
+        </p:nvSpPr>
+        <p:spPr/>
+        <p:txBody>
+          <a:bodyPr/>
+          <a:lstStyle/>
+          <a:p>
+            <a:r>
+              <a:rPr lang="en-GB" dirty="0" smtClean="0"/>
+              <a:t>The publisher is offering us an</a:t>
+            </a:r>
+            <a:r>
+              <a:rPr lang="en-GB" baseline="0" dirty="0" smtClean="0"/>
+              <a:t> initial investment of 150k, 100k of this being for the running of the business, such as salary for the staff and office space. The other 50k is listed as a marketing budget.</a:t>
+            </a:r>
+          </a:p>
+          <a:p>
+            <a:r>
+              <a:rPr lang="en-GB" baseline="0" dirty="0" smtClean="0"/>
+              <a:t>With the help of the marketing budget and selling via steam, the publisher is estimating that we can sell between 30-50k units at a price of £15 per unit. Once the investment is repaid there will be a 50/50 revenue split, at which point we will be making £5 per unit sold.</a:t>
+            </a:r>
+          </a:p>
+          <a:p>
+            <a:r>
+              <a:rPr lang="en-GB" baseline="0" dirty="0" smtClean="0"/>
+              <a:t>If we manage to reach 40k sales within the first month the publisher will fund another 6 months for the game to be ported to consoles, and another marketing investment of 150k will be allotted</a:t>
+            </a:r>
+          </a:p>
+          <a:p>
+            <a:r>
+              <a:rPr lang="en-GB" baseline="0" dirty="0" smtClean="0"/>
+              <a:t>If we take the deal the publisher will have first refusal rights for future projects that use the same IP</a:t>
+            </a:r>
+            <a:endParaRPr lang="en-GB" dirty="0"/>
+          </a:p>
+        </p:txBody>
+      </p:sp>
+      <p:sp>
+        <p:nvSpPr>
+          <p:cNvPr id="4" name="Slide Number Placeholder 3"/>
+          <p:cNvSpPr>
+            <a:spLocks noGrp="1"/>
+          </p:cNvSpPr>
+          <p:nvPr>
+            <p:ph type="sldNum" sz="quarter" idx="10"/>
+          </p:nvPr>
+        </p:nvSpPr>
+        <p:spPr/>
+        <p:txBody>
+          <a:bodyPr/>
+          <a:lstStyle/>
+          <a:p>
+            <a:fld id="{64232E02-0700-4753-8DBD-B1B244F2AE57}" type="slidenum">
+              <a:rPr lang="en-GB" smtClean="0"/>
+              <a:t>3</a:t>
+            </a:fld>
+            <a:endParaRPr lang="en-GB"/>
+          </a:p>
+        </p:txBody>
+      </p:sp>
+    </p:spTree>
+    <p:extLst>
+      <p:ext uri="{BB962C8B-B14F-4D97-AF65-F5344CB8AC3E}">
+        <p14:creationId xmlns:p14="http://schemas.microsoft.com/office/powerpoint/2010/main" val="1931303722"/>
+      </p:ext>
+    </p:extLst>
+  </p:cSld>
+  <p:clrMapOvr>
+    <a:masterClrMapping/>
+  </p:clrMapOvr>
+</p:notes>
+</file>
+
+<file path=ppt/notesSlides/notesSlide4.xml><?xml version="1.0" encoding="utf-8"?>
+<p:notes xmlns:a="http://schemas.openxmlformats.org/drawingml/2006/main" xmlns:r="http://schemas.openxmlformats.org/officeDocument/2006/relationships" xmlns:p="http://schemas.openxmlformats.org/presentationml/2006/main">
+  <p:cSld>
+    <p:spTree>
+      <p:nvGrpSpPr>
+        <p:cNvPr id="1" name=""/>
+        <p:cNvGrpSpPr/>
+        <p:nvPr/>
+      </p:nvGrpSpPr>
+      <p:grpSpPr>
+        <a:xfrm>
+          <a:off x="0" y="0"/>
+          <a:ext cx="0" cy="0"/>
+          <a:chOff x="0" y="0"/>
+          <a:chExt cx="0" cy="0"/>
+        </a:xfrm>
+      </p:grpSpPr>
+      <p:sp>
+        <p:nvSpPr>
+          <p:cNvPr id="2" name="Slide Image Placeholder 1"/>
+          <p:cNvSpPr>
+            <a:spLocks noGrp="1" noRot="1" noChangeAspect="1"/>
+          </p:cNvSpPr>
+          <p:nvPr>
+            <p:ph type="sldImg"/>
+          </p:nvPr>
+        </p:nvSpPr>
+        <p:spPr/>
+      </p:sp>
+      <p:sp>
+        <p:nvSpPr>
+          <p:cNvPr id="3" name="Notes Placeholder 2"/>
+          <p:cNvSpPr>
+            <a:spLocks noGrp="1"/>
+          </p:cNvSpPr>
+          <p:nvPr>
+            <p:ph type="body" idx="1"/>
+          </p:nvPr>
+        </p:nvSpPr>
+        <p:spPr/>
+        <p:txBody>
+          <a:bodyPr/>
+          <a:lstStyle/>
+          <a:p>
+            <a:r>
+              <a:rPr lang="en-GB" dirty="0" smtClean="0"/>
+              <a:t>After projecting the finances</a:t>
+            </a:r>
+            <a:r>
+              <a:rPr lang="en-GB" baseline="0" dirty="0" smtClean="0"/>
+              <a:t> for our current self publishing route we have a few possible outcomes.</a:t>
+            </a:r>
+          </a:p>
+          <a:p>
+            <a:r>
+              <a:rPr lang="en-GB" baseline="0" dirty="0" smtClean="0"/>
+              <a:t>These assume that we continue to work remotely, and don’t take an income from the company while developing.</a:t>
+            </a:r>
+          </a:p>
+          <a:p>
+            <a:r>
+              <a:rPr lang="en-GB" baseline="0" dirty="0" smtClean="0"/>
+              <a:t>We have estimated 10k sales via itch.io only, and with the agreed minimum net profit of £5 per sale we will expect to bring in 50k overall. </a:t>
+            </a:r>
+          </a:p>
+          <a:p>
+            <a:r>
+              <a:rPr lang="en-GB" baseline="0" dirty="0" smtClean="0"/>
+              <a:t>At this point we can split the money throughout the team making us £7150 each.</a:t>
+            </a:r>
+          </a:p>
+          <a:p>
+            <a:r>
+              <a:rPr lang="en-GB" baseline="0" dirty="0" smtClean="0"/>
+              <a:t>If however we sell the game at the same price the publisher has planned to sell the game for we will be making 150k, that being split gets everyone £20300.</a:t>
+            </a:r>
+          </a:p>
+          <a:p>
+            <a:r>
+              <a:rPr lang="en-GB" baseline="0" dirty="0" smtClean="0"/>
+              <a:t>This is more than we will make ourselves by taking the publisher deal, but it leaves the company itself with nothing, and I think it’s overly optimistic to expect decent sales at that price without any marketing budget.</a:t>
+            </a:r>
+          </a:p>
+          <a:p>
+            <a:r>
+              <a:rPr lang="en-GB" baseline="0" dirty="0" smtClean="0"/>
+              <a:t>The alternate route via self publishing is to not take the money and leave it in the company, by doing this we will be able to fund our own marketing budget for the next project, this could allow us to make a large amount of money on future projects by not needed to split the income with a publisher. However it would require us to continue to work without income for another project, is a fairly risky strategy and claiming benefits while making money for the company is an ethical choice I would rather avoid.</a:t>
+            </a:r>
+          </a:p>
+        </p:txBody>
+      </p:sp>
+      <p:sp>
+        <p:nvSpPr>
+          <p:cNvPr id="4" name="Slide Number Placeholder 3"/>
+          <p:cNvSpPr>
+            <a:spLocks noGrp="1"/>
+          </p:cNvSpPr>
+          <p:nvPr>
+            <p:ph type="sldNum" sz="quarter" idx="10"/>
+          </p:nvPr>
+        </p:nvSpPr>
+        <p:spPr/>
+        <p:txBody>
+          <a:bodyPr/>
+          <a:lstStyle/>
+          <a:p>
+            <a:fld id="{64232E02-0700-4753-8DBD-B1B244F2AE57}" type="slidenum">
+              <a:rPr lang="en-GB" smtClean="0"/>
+              <a:t>4</a:t>
+            </a:fld>
+            <a:endParaRPr lang="en-GB"/>
+          </a:p>
+        </p:txBody>
+      </p:sp>
+    </p:spTree>
+    <p:extLst>
+      <p:ext uri="{BB962C8B-B14F-4D97-AF65-F5344CB8AC3E}">
+        <p14:creationId xmlns:p14="http://schemas.microsoft.com/office/powerpoint/2010/main" val="140128786"/>
+      </p:ext>
+    </p:extLst>
+  </p:cSld>
+  <p:clrMapOvr>
+    <a:masterClrMapping/>
+  </p:clrMapOvr>
+</p:notes>
+</file>
+
+<file path=ppt/notesSlides/notesSlide5.xml><?xml version="1.0" encoding="utf-8"?>
+<p:notes xmlns:a="http://schemas.openxmlformats.org/drawingml/2006/main" xmlns:r="http://schemas.openxmlformats.org/officeDocument/2006/relationships" xmlns:p="http://schemas.openxmlformats.org/presentationml/2006/main">
+  <p:cSld>
+    <p:spTree>
+      <p:nvGrpSpPr>
+        <p:cNvPr id="1" name=""/>
+        <p:cNvGrpSpPr/>
+        <p:nvPr/>
+      </p:nvGrpSpPr>
+      <p:grpSpPr>
+        <a:xfrm>
+          <a:off x="0" y="0"/>
+          <a:ext cx="0" cy="0"/>
+          <a:chOff x="0" y="0"/>
+          <a:chExt cx="0" cy="0"/>
+        </a:xfrm>
+      </p:grpSpPr>
+      <p:sp>
+        <p:nvSpPr>
+          <p:cNvPr id="2" name="Slide Image Placeholder 1"/>
+          <p:cNvSpPr>
+            <a:spLocks noGrp="1" noRot="1" noChangeAspect="1"/>
+          </p:cNvSpPr>
+          <p:nvPr>
+            <p:ph type="sldImg"/>
+          </p:nvPr>
+        </p:nvSpPr>
+        <p:spPr/>
+      </p:sp>
+      <p:sp>
+        <p:nvSpPr>
+          <p:cNvPr id="3" name="Notes Placeholder 2"/>
+          <p:cNvSpPr>
+            <a:spLocks noGrp="1"/>
+          </p:cNvSpPr>
+          <p:nvPr>
+            <p:ph type="body" idx="1"/>
+          </p:nvPr>
+        </p:nvSpPr>
+        <p:spPr/>
+        <p:txBody>
+          <a:bodyPr/>
+          <a:lstStyle/>
+          <a:p>
+            <a:r>
+              <a:rPr lang="en-GB" dirty="0" smtClean="0"/>
+              <a:t>Taking the publisher deal will allow us to market the game and</a:t>
+            </a:r>
+            <a:r>
+              <a:rPr lang="en-GB" baseline="0" dirty="0" smtClean="0"/>
+              <a:t> sell via steam giving us estimated sales between 30-50k units. This large increase although cut with steam and the publisher will bring in more money than self publishing.</a:t>
+            </a:r>
+          </a:p>
+          <a:p>
+            <a:r>
+              <a:rPr lang="en-GB" baseline="0" dirty="0" smtClean="0"/>
+              <a:t>A major beneficial factor will also be that everyone will be able to start getting paid monthly at £2000 each and we will be able to afford office space so team cohesion should be nicer.</a:t>
+            </a:r>
+          </a:p>
+          <a:p>
+            <a:r>
+              <a:rPr lang="en-GB" baseline="0" dirty="0" smtClean="0"/>
+              <a:t>With everyone getting paid and us not relying purely on sales to fund ourselves the risk factor for the company is significantly lower than self publishing.</a:t>
+            </a:r>
+          </a:p>
+          <a:p>
+            <a:r>
+              <a:rPr lang="en-GB" baseline="0" dirty="0" smtClean="0"/>
+              <a:t>If we only sell at the minimum end of the estimate the company will have 60k.</a:t>
+            </a:r>
+          </a:p>
+          <a:p>
+            <a:r>
+              <a:rPr lang="en-GB" baseline="0" dirty="0" smtClean="0"/>
+              <a:t>Alternatively if we reach the top end at 50k sales we can expect the company to make a profit of 155k and trigger the console ports that will net us an additional 55k. </a:t>
+            </a:r>
+          </a:p>
+          <a:p>
+            <a:r>
+              <a:rPr lang="en-GB" baseline="0" dirty="0" smtClean="0"/>
+              <a:t>It’s important to note that these profits are for the company since we are already being paid a salary the extra profits can be used for the company to fund more work later down the line.</a:t>
+            </a:r>
+          </a:p>
+          <a:p>
+            <a:r>
+              <a:rPr lang="en-GB" baseline="0" dirty="0" smtClean="0"/>
+              <a:t>With a much more stable income it will be possible to safely work on future projects, and while working on the console ports we can look at </a:t>
+            </a:r>
+            <a:r>
+              <a:rPr lang="en-GB" baseline="0" dirty="0" err="1" smtClean="0"/>
+              <a:t>outcourcing</a:t>
+            </a:r>
+            <a:r>
+              <a:rPr lang="en-GB" baseline="0" dirty="0" smtClean="0"/>
+              <a:t> our team members that are not needed for the port to fund their salary and keep them on the team.</a:t>
+            </a:r>
+            <a:endParaRPr lang="en-GB" dirty="0"/>
+          </a:p>
+        </p:txBody>
+      </p:sp>
+      <p:sp>
+        <p:nvSpPr>
+          <p:cNvPr id="4" name="Slide Number Placeholder 3"/>
+          <p:cNvSpPr>
+            <a:spLocks noGrp="1"/>
+          </p:cNvSpPr>
+          <p:nvPr>
+            <p:ph type="sldNum" sz="quarter" idx="10"/>
+          </p:nvPr>
+        </p:nvSpPr>
+        <p:spPr/>
+        <p:txBody>
+          <a:bodyPr/>
+          <a:lstStyle/>
+          <a:p>
+            <a:fld id="{64232E02-0700-4753-8DBD-B1B244F2AE57}" type="slidenum">
+              <a:rPr lang="en-GB" smtClean="0"/>
+              <a:t>5</a:t>
+            </a:fld>
+            <a:endParaRPr lang="en-GB"/>
+          </a:p>
+        </p:txBody>
+      </p:sp>
+    </p:spTree>
+    <p:extLst>
+      <p:ext uri="{BB962C8B-B14F-4D97-AF65-F5344CB8AC3E}">
+        <p14:creationId xmlns:p14="http://schemas.microsoft.com/office/powerpoint/2010/main" val="1159430318"/>
+      </p:ext>
+    </p:extLst>
+  </p:cSld>
+  <p:clrMapOvr>
+    <a:masterClrMapping/>
+  </p:clrMapOvr>
+</p:notes>
+</file>
+
+<file path=ppt/notesSlides/notesSlide6.xml><?xml version="1.0" encoding="utf-8"?>
+<p:notes xmlns:a="http://schemas.openxmlformats.org/drawingml/2006/main" xmlns:r="http://schemas.openxmlformats.org/officeDocument/2006/relationships" xmlns:p="http://schemas.openxmlformats.org/presentationml/2006/main">
+  <p:cSld>
+    <p:spTree>
+      <p:nvGrpSpPr>
+        <p:cNvPr id="1" name=""/>
+        <p:cNvGrpSpPr/>
+        <p:nvPr/>
+      </p:nvGrpSpPr>
+      <p:grpSpPr>
+        <a:xfrm>
+          <a:off x="0" y="0"/>
+          <a:ext cx="0" cy="0"/>
+          <a:chOff x="0" y="0"/>
+          <a:chExt cx="0" cy="0"/>
+        </a:xfrm>
+      </p:grpSpPr>
+      <p:sp>
+        <p:nvSpPr>
+          <p:cNvPr id="2" name="Slide Image Placeholder 1"/>
+          <p:cNvSpPr>
+            <a:spLocks noGrp="1" noRot="1" noChangeAspect="1"/>
+          </p:cNvSpPr>
+          <p:nvPr>
+            <p:ph type="sldImg"/>
+          </p:nvPr>
+        </p:nvSpPr>
+        <p:spPr/>
+      </p:sp>
+      <p:sp>
+        <p:nvSpPr>
+          <p:cNvPr id="3" name="Notes Placeholder 2"/>
+          <p:cNvSpPr>
+            <a:spLocks noGrp="1"/>
+          </p:cNvSpPr>
+          <p:nvPr>
+            <p:ph type="body" idx="1"/>
+          </p:nvPr>
+        </p:nvSpPr>
+        <p:spPr/>
+        <p:txBody>
+          <a:bodyPr/>
+          <a:lstStyle/>
+          <a:p>
+            <a:r>
+              <a:rPr lang="en-GB" dirty="0" smtClean="0"/>
+              <a:t>So to conclude this presentation I have decided that it</a:t>
+            </a:r>
+            <a:r>
+              <a:rPr lang="en-GB" baseline="0" dirty="0" smtClean="0"/>
+              <a:t> is a better choice for us to take the publisher deal.</a:t>
+            </a:r>
+          </a:p>
+          <a:p>
+            <a:r>
+              <a:rPr lang="en-GB" baseline="0" dirty="0" smtClean="0"/>
+              <a:t>This is because of the lower risk for the company and its staff.</a:t>
+            </a:r>
+          </a:p>
+          <a:p>
+            <a:r>
+              <a:rPr lang="en-GB" baseline="0" dirty="0" smtClean="0"/>
+              <a:t>We get paid no matter what happens and that’s a much better life style than the one we will live while self publishing</a:t>
+            </a:r>
+          </a:p>
+          <a:p>
+            <a:r>
+              <a:rPr lang="en-GB" baseline="0" dirty="0" smtClean="0"/>
+              <a:t>We are able to get some office space and work together daily hopefully driving a better end project towards market</a:t>
+            </a:r>
+          </a:p>
+          <a:p>
+            <a:r>
+              <a:rPr lang="en-GB" baseline="0" dirty="0" smtClean="0"/>
+              <a:t>We stand in a good place to make better profits for the company itself without our staff having to live a detrimental life style</a:t>
+            </a:r>
+          </a:p>
+          <a:p>
+            <a:r>
+              <a:rPr lang="en-GB" baseline="0" dirty="0" smtClean="0"/>
+              <a:t>We get a wider market reach via steam and the possible console releases helping us build our brand and create awareness of the company</a:t>
+            </a:r>
+          </a:p>
+          <a:p>
+            <a:r>
+              <a:rPr lang="en-GB" baseline="0" dirty="0" smtClean="0"/>
+              <a:t>It will be easier for the company to continue to run and create new projects</a:t>
+            </a:r>
+          </a:p>
+          <a:p>
+            <a:r>
+              <a:rPr lang="en-GB" baseline="0" dirty="0" smtClean="0"/>
+              <a:t>Assuming we reach good sales </a:t>
+            </a:r>
+            <a:r>
+              <a:rPr lang="en-GB" baseline="0" smtClean="0"/>
+              <a:t>we will be </a:t>
+            </a:r>
+            <a:r>
+              <a:rPr lang="en-GB" baseline="0" dirty="0" smtClean="0"/>
+              <a:t>in good standing with a publisher opening additional opportunities in the future</a:t>
+            </a:r>
+            <a:endParaRPr lang="en-GB" dirty="0"/>
+          </a:p>
+        </p:txBody>
+      </p:sp>
+      <p:sp>
+        <p:nvSpPr>
+          <p:cNvPr id="4" name="Slide Number Placeholder 3"/>
+          <p:cNvSpPr>
+            <a:spLocks noGrp="1"/>
+          </p:cNvSpPr>
+          <p:nvPr>
+            <p:ph type="sldNum" sz="quarter" idx="10"/>
+          </p:nvPr>
+        </p:nvSpPr>
+        <p:spPr/>
+        <p:txBody>
+          <a:bodyPr/>
+          <a:lstStyle/>
+          <a:p>
+            <a:fld id="{64232E02-0700-4753-8DBD-B1B244F2AE57}" type="slidenum">
+              <a:rPr lang="en-GB" smtClean="0"/>
+              <a:t>6</a:t>
+            </a:fld>
+            <a:endParaRPr lang="en-GB"/>
+          </a:p>
+        </p:txBody>
+      </p:sp>
+    </p:spTree>
+    <p:extLst>
+      <p:ext uri="{BB962C8B-B14F-4D97-AF65-F5344CB8AC3E}">
+        <p14:creationId xmlns:p14="http://schemas.microsoft.com/office/powerpoint/2010/main" val="3528440419"/>
+      </p:ext>
+    </p:extLst>
+  </p:cSld>
+  <p:clrMapOvr>
+    <a:masterClrMapping/>
+  </p:clrMapOvr>
+</p:notes>
 </file>
 
 <file path=ppt/slideLayouts/slideLayout1.xml><?xml version="1.0" encoding="utf-8"?>
@@ -2983,7 +4059,7 @@
           <p:nvPr/>
         </p:nvPicPr>
         <p:blipFill>
-          <a:blip r:embed="rId2">
+          <a:blip r:embed="rId3">
             <a:duotone>
               <a:schemeClr val="bg2">
                 <a:shade val="45000"/>
@@ -3076,11 +4152,11 @@
           <p:nvPr/>
         </p:nvPicPr>
         <p:blipFill>
-          <a:blip r:embed="rId3" cstate="print">
+          <a:blip r:embed="rId4" cstate="print">
             <a:extLst>
               <a:ext uri="{BEBA8EAE-BF5A-486C-A8C5-ECC9F3942E4B}">
                 <a14:imgProps xmlns:a14="http://schemas.microsoft.com/office/drawing/2010/main">
-                  <a14:imgLayer r:embed="rId4">
+                  <a14:imgLayer r:embed="rId5">
                     <a14:imgEffect>
                       <a14:brightnessContrast bright="-40000" contrast="40000"/>
                     </a14:imgEffect>
@@ -3115,11 +4191,11 @@
           <p:nvPr/>
         </p:nvPicPr>
         <p:blipFill>
-          <a:blip r:embed="rId5" cstate="print">
+          <a:blip r:embed="rId6" cstate="print">
             <a:extLst>
               <a:ext uri="{BEBA8EAE-BF5A-486C-A8C5-ECC9F3942E4B}">
                 <a14:imgProps xmlns:a14="http://schemas.microsoft.com/office/drawing/2010/main">
-                  <a14:imgLayer r:embed="rId4">
+                  <a14:imgLayer r:embed="rId5">
                     <a14:imgEffect>
                       <a14:brightnessContrast bright="-40000" contrast="40000"/>
                     </a14:imgEffect>
@@ -3191,7 +4267,7 @@
           <p:nvPr/>
         </p:nvPicPr>
         <p:blipFill>
-          <a:blip r:embed="rId2">
+          <a:blip r:embed="rId3">
             <a:duotone>
               <a:schemeClr val="bg2">
                 <a:shade val="45000"/>
@@ -3304,7 +4380,7 @@
           <p:nvPr/>
         </p:nvPicPr>
         <p:blipFill rotWithShape="1">
-          <a:blip r:embed="rId3" cstate="print">
+          <a:blip r:embed="rId4" cstate="print">
             <a:extLst>
               <a:ext uri="{28A0092B-C50C-407E-A947-70E740481C1C}">
                 <a14:useLocalDpi xmlns:a14="http://schemas.microsoft.com/office/drawing/2010/main" val="0"/>
@@ -3598,7 +4674,7 @@
           <p:nvPr/>
         </p:nvPicPr>
         <p:blipFill>
-          <a:blip r:embed="rId2">
+          <a:blip r:embed="rId3">
             <a:duotone>
               <a:schemeClr val="bg2">
                 <a:shade val="45000"/>
@@ -3678,8 +4754,19 @@
           <a:p>
             <a:r>
               <a:rPr lang="en-GB" sz="3000" dirty="0" smtClean="0"/>
-              <a:t>150k investment</a:t>
-            </a:r>
+              <a:t>150k </a:t>
+            </a:r>
+            <a:r>
+              <a:rPr lang="en-GB" sz="3000" dirty="0" smtClean="0"/>
+              <a:t>investment</a:t>
+            </a:r>
+          </a:p>
+          <a:p>
+            <a:r>
+              <a:rPr lang="en-GB" sz="3000" dirty="0"/>
+              <a:t>Sales via steam </a:t>
+            </a:r>
+            <a:endParaRPr lang="en-GB" sz="3000" dirty="0" smtClean="0"/>
           </a:p>
           <a:p>
             <a:r>
@@ -3696,13 +4783,11 @@
           <a:p>
             <a:r>
               <a:rPr lang="en-GB" sz="3000" dirty="0" smtClean="0"/>
-              <a:t>Sales via steam </a:t>
-            </a:r>
-          </a:p>
-          <a:p>
+              <a:t>Possible </a:t>
+            </a:r>
             <a:r>
               <a:rPr lang="en-GB" sz="3000" dirty="0" smtClean="0"/>
-              <a:t>Possible console port at 40k sales</a:t>
+              <a:t>console port at 40k sales</a:t>
             </a:r>
           </a:p>
           <a:p>
@@ -3725,7 +4810,7 @@
           <p:nvPr/>
         </p:nvPicPr>
         <p:blipFill rotWithShape="1">
-          <a:blip r:embed="rId3" cstate="print">
+          <a:blip r:embed="rId4" cstate="print">
             <a:extLst>
               <a:ext uri="{28A0092B-C50C-407E-A947-70E740481C1C}">
                 <a14:useLocalDpi xmlns:a14="http://schemas.microsoft.com/office/drawing/2010/main" val="0"/>
@@ -4117,7 +5202,7 @@
           <p:nvPr/>
         </p:nvPicPr>
         <p:blipFill>
-          <a:blip r:embed="rId2">
+          <a:blip r:embed="rId3">
             <a:duotone>
               <a:schemeClr val="bg2">
                 <a:shade val="45000"/>
@@ -4203,10 +5288,12 @@
           <a:p>
             <a:r>
               <a:rPr lang="en-GB" sz="3000" dirty="0" smtClean="0"/>
-              <a:t>£7150 each</a:t>
-            </a:r>
-          </a:p>
-          <a:p>
+              <a:t>£7150 </a:t>
+            </a:r>
+            <a:r>
+              <a:rPr lang="en-GB" sz="3000" dirty="0" smtClean="0"/>
+              <a:t>each</a:t>
+            </a:r>
             <a:endParaRPr lang="en-GB" sz="3000" dirty="0"/>
           </a:p>
           <a:p>
@@ -4219,16 +5306,31 @@
           <a:p>
             <a:r>
               <a:rPr lang="en-GB" sz="3000" dirty="0" smtClean="0"/>
-              <a:t>£20300 each</a:t>
-            </a:r>
-          </a:p>
-          <a:p>
+              <a:t>£20300 </a:t>
+            </a:r>
+            <a:r>
+              <a:rPr lang="en-GB" sz="3000" dirty="0" smtClean="0"/>
+              <a:t>each</a:t>
+            </a:r>
             <a:endParaRPr lang="en-GB" sz="3000" dirty="0"/>
           </a:p>
           <a:p>
             <a:r>
               <a:rPr lang="en-GB" sz="3000" dirty="0" smtClean="0"/>
-              <a:t>Nothing in company coffers</a:t>
+              <a:t>Nothing in company </a:t>
+            </a:r>
+            <a:r>
+              <a:rPr lang="en-GB" sz="3000" dirty="0" smtClean="0"/>
+              <a:t>coffers</a:t>
+            </a:r>
+          </a:p>
+          <a:p>
+            <a:endParaRPr lang="en-GB" sz="3000" dirty="0" smtClean="0"/>
+          </a:p>
+          <a:p>
+            <a:r>
+              <a:rPr lang="en-GB" sz="3000" dirty="0" smtClean="0"/>
+              <a:t>OR We fund the company</a:t>
             </a:r>
           </a:p>
         </p:txBody>
@@ -4242,7 +5344,7 @@
           <p:nvPr/>
         </p:nvPicPr>
         <p:blipFill rotWithShape="1">
-          <a:blip r:embed="rId3" cstate="print">
+          <a:blip r:embed="rId4" cstate="print">
             <a:extLst>
               <a:ext uri="{28A0092B-C50C-407E-A947-70E740481C1C}">
                 <a14:useLocalDpi xmlns:a14="http://schemas.microsoft.com/office/drawing/2010/main" val="0"/>
@@ -4461,7 +5563,7 @@
                                         <p:tgtEl>
                                           <p:spTgt spid="3">
                                             <p:txEl>
-                                              <p:pRg st="4" end="4"/>
+                                              <p:pRg st="3" end="3"/>
                                             </p:txEl>
                                           </p:spTgt>
                                         </p:tgtEl>
@@ -4510,7 +5612,7 @@
                                         <p:tgtEl>
                                           <p:spTgt spid="3">
                                             <p:txEl>
-                                              <p:pRg st="5" end="5"/>
+                                              <p:pRg st="4" end="4"/>
                                             </p:txEl>
                                           </p:spTgt>
                                         </p:tgtEl>
@@ -4552,6 +5654,55 @@
                                     <p:set>
                                       <p:cBhvr>
                                         <p:cTn id="26" dur="1" fill="hold">
+                                          <p:stCondLst>
+                                            <p:cond delay="0"/>
+                                          </p:stCondLst>
+                                        </p:cTn>
+                                        <p:tgtEl>
+                                          <p:spTgt spid="3">
+                                            <p:txEl>
+                                              <p:pRg st="5" end="5"/>
+                                            </p:txEl>
+                                          </p:spTgt>
+                                        </p:tgtEl>
+                                        <p:attrNameLst>
+                                          <p:attrName>style.visibility</p:attrName>
+                                        </p:attrNameLst>
+                                      </p:cBhvr>
+                                      <p:to>
+                                        <p:strVal val="visible"/>
+                                      </p:to>
+                                    </p:set>
+                                  </p:childTnLst>
+                                </p:cTn>
+                              </p:par>
+                            </p:childTnLst>
+                          </p:cTn>
+                        </p:par>
+                      </p:childTnLst>
+                    </p:cTn>
+                  </p:par>
+                  <p:par>
+                    <p:cTn id="27" fill="hold">
+                      <p:stCondLst>
+                        <p:cond delay="indefinite"/>
+                      </p:stCondLst>
+                      <p:childTnLst>
+                        <p:par>
+                          <p:cTn id="28" fill="hold">
+                            <p:stCondLst>
+                              <p:cond delay="0"/>
+                            </p:stCondLst>
+                            <p:childTnLst>
+                              <p:par>
+                                <p:cTn id="29" presetID="1" presetClass="entr" presetSubtype="0" fill="hold" grpId="0" nodeType="clickEffect">
+                                  <p:stCondLst>
+                                    <p:cond delay="0"/>
+                                  </p:stCondLst>
+                                  <p:childTnLst>
+                                    <p:set>
+                                      <p:cBhvr>
+                                        <p:cTn id="30" dur="1" fill="hold">
                                           <p:stCondLst>
                                             <p:cond delay="0"/>
                                           </p:stCondLst>
@@ -4634,7 +5785,7 @@
           <p:nvPr/>
         </p:nvPicPr>
         <p:blipFill>
-          <a:blip r:embed="rId2">
+          <a:blip r:embed="rId3">
             <a:duotone>
               <a:schemeClr val="bg2">
                 <a:shade val="45000"/>
@@ -4775,7 +5926,7 @@
           <p:nvPr/>
         </p:nvPicPr>
         <p:blipFill rotWithShape="1">
-          <a:blip r:embed="rId3" cstate="print">
+          <a:blip r:embed="rId4" cstate="print">
             <a:extLst>
               <a:ext uri="{28A0092B-C50C-407E-A947-70E740481C1C}">
                 <a14:useLocalDpi xmlns:a14="http://schemas.microsoft.com/office/drawing/2010/main" val="0"/>
@@ -5314,7 +6465,7 @@
           <p:nvPr/>
         </p:nvPicPr>
         <p:blipFill>
-          <a:blip r:embed="rId2">
+          <a:blip r:embed="rId3">
             <a:duotone>
               <a:schemeClr val="bg2">
                 <a:shade val="45000"/>
@@ -5392,8 +6543,19 @@
           <a:p>
             <a:r>
               <a:rPr lang="en-GB" sz="3000" dirty="0" smtClean="0"/>
-              <a:t>People get paid</a:t>
-            </a:r>
+              <a:t>People get </a:t>
+            </a:r>
+            <a:r>
+              <a:rPr lang="en-GB" sz="3000" dirty="0" smtClean="0"/>
+              <a:t>paid</a:t>
+            </a:r>
+          </a:p>
+          <a:p>
+            <a:r>
+              <a:rPr lang="en-GB" sz="3000" dirty="0" smtClean="0"/>
+              <a:t>Offices</a:t>
+            </a:r>
+            <a:endParaRPr lang="en-GB" sz="3000" dirty="0" smtClean="0"/>
           </a:p>
           <a:p>
             <a:r>
@@ -5410,8 +6572,19 @@
           <a:p>
             <a:r>
               <a:rPr lang="en-GB" sz="3000" dirty="0" smtClean="0"/>
-              <a:t>Easier for the company to continue</a:t>
-            </a:r>
+              <a:t>Easier for the company to </a:t>
+            </a:r>
+            <a:r>
+              <a:rPr lang="en-GB" sz="3000" dirty="0" smtClean="0"/>
+              <a:t>continue</a:t>
+            </a:r>
+          </a:p>
+          <a:p>
+            <a:r>
+              <a:rPr lang="en-GB" sz="3000" dirty="0" smtClean="0"/>
+              <a:t>Good standing with publisher</a:t>
+            </a:r>
+            <a:endParaRPr lang="en-GB" sz="3000" dirty="0" smtClean="0"/>
           </a:p>
           <a:p>
             <a:endParaRPr lang="en-GB" dirty="0"/>
@@ -5427,7 +6600,7 @@
           <p:nvPr/>
         </p:nvPicPr>
         <p:blipFill rotWithShape="1">
-          <a:blip r:embed="rId3" cstate="print">
+          <a:blip r:embed="rId4" cstate="print">
             <a:extLst>
               <a:ext uri="{28A0092B-C50C-407E-A947-70E740481C1C}">
                 <a14:useLocalDpi xmlns:a14="http://schemas.microsoft.com/office/drawing/2010/main" val="0"/>
@@ -5696,6 +6869,104 @@
                                           <p:spTgt spid="3">
                                             <p:txEl>
                                               <p:pRg st="4" end="4"/>
+                                            </p:txEl>
+                                          </p:spTgt>
+                                        </p:tgtEl>
+                                        <p:attrNameLst>
+                                          <p:attrName>style.visibility</p:attrName>
+                                        </p:attrNameLst>
+                                      </p:cBhvr>
+                                      <p:to>
+                                        <p:strVal val="visible"/>
+                                      </p:to>
+                                    </p:set>
+                                  </p:childTnLst>
+                                </p:cTn>
+                              </p:par>
+                            </p:childTnLst>
+                          </p:cTn>
+                        </p:par>
+                      </p:childTnLst>
+                    </p:cTn>
+                  </p:par>
+                  <p:par>
+                    <p:cTn id="23" fill="hold">
+                      <p:stCondLst>
+                        <p:cond delay="indefinite"/>
+                      </p:stCondLst>
+                      <p:childTnLst>
+                        <p:par>
+                          <p:cTn id="24" fill="hold">
+                            <p:stCondLst>
+                              <p:cond delay="0"/>
+                            </p:stCondLst>
+                            <p:childTnLst>
+                              <p:par>
+                                <p:cTn id="25" presetID="1" presetClass="entr" presetSubtype="0" fill="hold" grpId="0" nodeType="clickEffect">
+                                  <p:stCondLst>
+                                    <p:cond delay="0"/>
+                                  </p:stCondLst>
+                                  <p:childTnLst>
+                                    <p:set>
+                                      <p:cBhvr>
+                                        <p:cTn id="26" dur="1" fill="hold">
+                                          <p:stCondLst>
+                                            <p:cond delay="0"/>
+                                          </p:stCondLst>
+                                        </p:cTn>
+                                        <p:tgtEl>
+                                          <p:spTgt spid="3">
+                                            <p:txEl>
+                                              <p:pRg st="5" end="5"/>
+                                            </p:txEl>
+                                          </p:spTgt>
+                                        </p:tgtEl>
+                                        <p:attrNameLst>
+                                          <p:attrName>style.visibility</p:attrName>
+                                        </p:attrNameLst>
+                                      </p:cBhvr>
+                                      <p:to>
+                                        <p:strVal val="visible"/>
+                                      </p:to>
+                                    </p:set>
+                                  </p:childTnLst>
+                                </p:cTn>
+                              </p:par>
+                            </p:childTnLst>
+                          </p:cTn>
+                        </p:par>
+                      </p:childTnLst>
+                    </p:cTn>
+                  </p:par>
+                  <p:par>
+                    <p:cTn id="27" fill="hold">
+                      <p:stCondLst>
+                        <p:cond delay="indefinite"/>
+                      </p:stCondLst>
+                      <p:childTnLst>
+                        <p:par>
+                          <p:cTn id="28" fill="hold">
+                            <p:stCondLst>
+                              <p:cond delay="0"/>
+                            </p:stCondLst>
+                            <p:childTnLst>
+                              <p:par>
+                                <p:cTn id="29" presetID="1" presetClass="entr" presetSubtype="0" fill="hold" grpId="0" nodeType="clickEffect">
+                                  <p:stCondLst>
+                                    <p:cond delay="0"/>
+                                  </p:stCondLst>
+                                  <p:childTnLst>
+                                    <p:set>
+                                      <p:cBhvr>
+                                        <p:cTn id="30" dur="1" fill="hold">
+                                          <p:stCondLst>
+                                            <p:cond delay="0"/>
+                                          </p:stCondLst>
+                                        </p:cTn>
+                                        <p:tgtEl>
+                                          <p:spTgt spid="3">
+                                            <p:txEl>
+                                              <p:pRg st="6" end="6"/>
                                             </p:txEl>
                                           </p:spTgt>
                                         </p:tgtEl>
@@ -6003,4 +7274,265 @@
     </a:ext>
   </a:extLst>
 </a:theme>
+</file>
+
+<file path=ppt/theme/theme2.xml><?xml version="1.0" encoding="utf-8"?>
+<a:theme xmlns:a="http://schemas.openxmlformats.org/drawingml/2006/main" name="Office Theme">
+  <a:themeElements>
+    <a:clrScheme name="Office">
+      <a:dk1>
+        <a:sysClr val="windowText" lastClr="000000"/>
+      </a:dk1>
+      <a:lt1>
+        <a:sysClr val="window" lastClr="FFFFFF"/>
+      </a:lt1>
+      <a:dk2>
+        <a:srgbClr val="44546A"/>
+      </a:dk2>
+      <a:lt2>
+        <a:srgbClr val="E7E6E6"/>
+      </a:lt2>
+      <a:accent1>
+        <a:srgbClr val="5B9BD5"/>
+      </a:accent1>
+      <a:accent2>
+        <a:srgbClr val="ED7D31"/>
+      </a:accent2>
+      <a:accent3>
+        <a:srgbClr val="A5A5A5"/>
+      </a:accent3>
+      <a:accent4>
+        <a:srgbClr val="FFC000"/>
+      </a:accent4>
+      <a:accent5>
+        <a:srgbClr val="4472C4"/>
+      </a:accent5>
+      <a:accent6>
+        <a:srgbClr val="70AD47"/>
+      </a:accent6>
+      <a:hlink>
+        <a:srgbClr val="0563C1"/>
+      </a:hlink>
+      <a:folHlink>
+        <a:srgbClr val="954F72"/>
+      </a:folHlink>
+    </a:clrScheme>
+    <a:fontScheme name="Office">
+      <a:majorFont>
+        <a:latin typeface="Calibri Light" panose="020F0302020204030204"/>
+        <a:ea typeface=""/>
+        <a:cs typeface=""/>
+        <a:font script="Jpan" typeface="游ゴシック Light"/>
+        <a:font script="Hang" typeface="맑은 고딕"/>
+        <a:font script="Hans" typeface="等线 Light"/>
+        <a:font script="Hant" typeface="新細明體"/>
+        <a:font script="Arab" typeface="Times New Roman"/>
+        <a:font script="Hebr" typeface="Times New Roman"/>
+        <a:font script="Thai" typeface="Angsana New"/>
+        <a:font script="Ethi" typeface="Nyala"/>
+        <a:font script="Beng" typeface="Vrinda"/>
+        <a:font script="Gujr" typeface="Shruti"/>
+        <a:font script="Khmr" typeface="MoolBoran"/>
+        <a:font script="Knda" typeface="Tunga"/>
+        <a:font script="Guru" typeface="Raavi"/>
+        <a:font script="Cans" typeface="Euphemia"/>
+        <a:font script="Cher" typeface="Plantagenet Cherokee"/>
+        <a:font script="Yiii" typeface="Microsoft Yi Baiti"/>
+        <a:font script="Tibt" typeface="Microsoft Himalaya"/>
+        <a:font script="Thaa" typeface="MV Boli"/>
+        <a:font script="Deva" typeface="Mangal"/>
+        <a:font script="Telu" typeface="Gautami"/>
+        <a:font script="Taml" typeface="Latha"/>
+        <a:font script="Syrc" typeface="Estrangelo Edessa"/>
+        <a:font script="Orya" typeface="Kalinga"/>
+        <a:font script="Mlym" typeface="Kartika"/>
+        <a:font script="Laoo" typeface="DokChampa"/>
+        <a:font script="Sinh" typeface="Iskoola Pota"/>
+        <a:font script="Mong" typeface="Mongolian Baiti"/>
+        <a:font script="Viet" typeface="Times New Roman"/>
+        <a:font script="Uigh" typeface="Microsoft Uighur"/>
+        <a:font script="Geor" typeface="Sylfaen"/>
+      </a:majorFont>
+      <a:minorFont>
+        <a:latin typeface="Calibri" panose="020F0502020204030204"/>
+        <a:ea typeface=""/>
+        <a:cs typeface=""/>
+        <a:font script="Jpan" typeface="游ゴシック"/>
+        <a:font script="Hang" typeface="맑은 고딕"/>
+        <a:font script="Hans" typeface="等线"/>
+        <a:font script="Hant" typeface="新細明體"/>
+        <a:font script="Arab" typeface="Arial"/>
+        <a:font script="Hebr" typeface="Arial"/>
+        <a:font script="Thai" typeface="Cordia New"/>
+        <a:font script="Ethi" typeface="Nyala"/>
+        <a:font script="Beng" typeface="Vrinda"/>
+        <a:font script="Gujr" typeface="Shruti"/>
+        <a:font script="Khmr" typeface="DaunPenh"/>
+        <a:font script="Knda" typeface="Tunga"/>
+        <a:font script="Guru" typeface="Raavi"/>
+        <a:font script="Cans" typeface="Euphemia"/>
+        <a:font script="Cher" typeface="Plantagenet Cherokee"/>
+        <a:font script="Yiii" typeface="Microsoft Yi Baiti"/>
+        <a:font script="Tibt" typeface="Microsoft Himalaya"/>
+        <a:font script="Thaa" typeface="MV Boli"/>
+        <a:font script="Deva" typeface="Mangal"/>
+        <a:font script="Telu" typeface="Gautami"/>
+        <a:font script="Taml" typeface="Latha"/>
+        <a:font script="Syrc" typeface="Estrangelo Edessa"/>
+        <a:font script="Orya" typeface="Kalinga"/>
+        <a:font script="Mlym" typeface="Kartika"/>
+        <a:font script="Laoo" typeface="DokChampa"/>
+        <a:font script="Sinh" typeface="Iskoola Pota"/>
+        <a:font script="Mong" typeface="Mongolian Baiti"/>
+        <a:font script="Viet" typeface="Arial"/>
+        <a:font script="Uigh" typeface="Microsoft Uighur"/>
+        <a:font script="Geor" typeface="Sylfaen"/>
+      </a:minorFont>
+    </a:fontScheme>
+    <a:fmtScheme name="Office">
+      <a:fillStyleLst>
+        <a:solidFill>
+          <a:schemeClr val="phClr"/>
+        </a:solidFill>
+        <a:gradFill rotWithShape="1">
+          <a:gsLst>
+            <a:gs pos="0">
+              <a:schemeClr val="phClr">
+                <a:lumMod val="110000"/>
+                <a:satMod val="105000"/>
+                <a:tint val="67000"/>
+              </a:schemeClr>
+            </a:gs>
+            <a:gs pos="50000">
+              <a:schemeClr val="phClr">
+                <a:lumMod val="105000"/>
+                <a:satMod val="103000"/>
+                <a:tint val="73000"/>
+              </a:schemeClr>
+            </a:gs>
+            <a:gs pos="100000">
+              <a:schemeClr val="phClr">
+                <a:lumMod val="105000"/>
+                <a:satMod val="109000"/>
+                <a:tint val="81000"/>
+              </a:schemeClr>
+            </a:gs>
+          </a:gsLst>
+          <a:lin ang="5400000" scaled="0"/>
+        </a:gradFill>
+        <a:gradFill rotWithShape="1">
+          <a:gsLst>
+            <a:gs pos="0">
+              <a:schemeClr val="phClr">
+                <a:satMod val="103000"/>
+                <a:lumMod val="102000"/>
+                <a:tint val="94000"/>
+              </a:schemeClr>
+            </a:gs>
+            <a:gs pos="50000">
+              <a:schemeClr val="phClr">
+                <a:satMod val="110000"/>
+                <a:lumMod val="100000"/>
+                <a:shade val="100000"/>
+              </a:schemeClr>
+            </a:gs>
+            <a:gs pos="100000">
+              <a:schemeClr val="phClr">
+                <a:lumMod val="99000"/>
+                <a:satMod val="120000"/>
+                <a:shade val="78000"/>
+              </a:schemeClr>
+            </a:gs>
+          </a:gsLst>
+          <a:lin ang="5400000" scaled="0"/>
+        </a:gradFill>
+      </a:fillStyleLst>
+      <a:lnStyleLst>
+        <a:ln w="6350" cap="flat" cmpd="sng" algn="ctr">
+          <a:solidFill>
+            <a:schemeClr val="phClr"/>
+          </a:solidFill>
+          <a:prstDash val="solid"/>
+          <a:miter lim="800000"/>
+        </a:ln>
+        <a:ln w="12700" cap="flat" cmpd="sng" algn="ctr">
+          <a:solidFill>
+            <a:schemeClr val="phClr"/>
+          </a:solidFill>
+          <a:prstDash val="solid"/>
+          <a:miter lim="800000"/>
+        </a:ln>
+        <a:ln w="19050" cap="flat" cmpd="sng" algn="ctr">
+          <a:solidFill>
+            <a:schemeClr val="phClr"/>
+          </a:solidFill>
+          <a:prstDash val="solid"/>
+          <a:miter lim="800000"/>
+        </a:ln>
+      </a:lnStyleLst>
+      <a:effectStyleLst>
+        <a:effectStyle>
+          <a:effectLst/>
+        </a:effectStyle>
+        <a:effectStyle>
+          <a:effectLst/>
+        </a:effectStyle>
+        <a:effectStyle>
+          <a:effectLst>
+            <a:outerShdw blurRad="57150" dist="19050" dir="5400000" algn="ctr" rotWithShape="0">
+              <a:srgbClr val="000000">
+                <a:alpha val="63000"/>
+              </a:srgbClr>
+            </a:outerShdw>
+          </a:effectLst>
+        </a:effectStyle>
+      </a:effectStyleLst>
+      <a:bgFillStyleLst>
+        <a:solidFill>
+          <a:schemeClr val="phClr"/>
+        </a:solidFill>
+        <a:solidFill>
+          <a:schemeClr val="phClr">
+            <a:tint val="95000"/>
+            <a:satMod val="170000"/>
+          </a:schemeClr>
+        </a:solidFill>
+        <a:gradFill rotWithShape="1">
+          <a:gsLst>
+            <a:gs pos="0">
+              <a:schemeClr val="phClr">
+                <a:tint val="93000"/>
+                <a:satMod val="150000"/>
+                <a:shade val="98000"/>
+                <a:lumMod val="102000"/>
+              </a:schemeClr>
+            </a:gs>
+            <a:gs pos="50000">
+              <a:schemeClr val="phClr">
+                <a:tint val="98000"/>
+                <a:satMod val="130000"/>
+                <a:shade val="90000"/>
+                <a:lumMod val="103000"/>
+              </a:schemeClr>
+            </a:gs>
+            <a:gs pos="100000">
+              <a:schemeClr val="phClr">
+                <a:shade val="63000"/>
+                <a:satMod val="120000"/>
+              </a:schemeClr>
+            </a:gs>
+          </a:gsLst>
+          <a:lin ang="5400000" scaled="0"/>
+        </a:gradFill>
+      </a:bgFillStyleLst>
+    </a:fmtScheme>
+  </a:themeElements>
+  <a:objectDefaults/>
+  <a:extraClrSchemeLst/>
+  <a:extLst>
+    <a:ext uri="{05A4C25C-085E-4340-85A3-A5531E510DB2}">
+      <thm15:themeFamily xmlns:thm15="http://schemas.microsoft.com/office/thememl/2012/main" name="Office Theme" id="{62F939B6-93AF-4DB8-9C6B-D6C7DFDC589F}" vid="{4A3C46E8-61CC-4603-A589-7422A47A8E4A}"/>
+    </a:ext>
+  </a:extLst>
+</a:theme>
 </file>
</xml_diff>